<commit_message>
Pre-submission to Gravity. Solid EFE solutions.
</commit_message>
<xml_diff>
--- a/Spacetime Interval.pptx
+++ b/Spacetime Interval.pptx
@@ -278,7 +278,7 @@
           <a:p>
             <a:fld id="{A881878F-9A12-42FD-A084-B13F414915E6}" type="datetimeFigureOut">
               <a:rPr lang="en-US" smtClean="0"/>
-              <a:t>8/19/2022</a:t>
+              <a:t>9/2/2023</a:t>
             </a:fld>
             <a:endParaRPr lang="en-US"/>
           </a:p>
@@ -476,7 +476,7 @@
           <a:p>
             <a:fld id="{A881878F-9A12-42FD-A084-B13F414915E6}" type="datetimeFigureOut">
               <a:rPr lang="en-US" smtClean="0"/>
-              <a:t>8/19/2022</a:t>
+              <a:t>9/2/2023</a:t>
             </a:fld>
             <a:endParaRPr lang="en-US"/>
           </a:p>
@@ -684,7 +684,7 @@
           <a:p>
             <a:fld id="{A881878F-9A12-42FD-A084-B13F414915E6}" type="datetimeFigureOut">
               <a:rPr lang="en-US" smtClean="0"/>
-              <a:t>8/19/2022</a:t>
+              <a:t>9/2/2023</a:t>
             </a:fld>
             <a:endParaRPr lang="en-US"/>
           </a:p>
@@ -882,7 +882,7 @@
           <a:p>
             <a:fld id="{A881878F-9A12-42FD-A084-B13F414915E6}" type="datetimeFigureOut">
               <a:rPr lang="en-US" smtClean="0"/>
-              <a:t>8/19/2022</a:t>
+              <a:t>9/2/2023</a:t>
             </a:fld>
             <a:endParaRPr lang="en-US"/>
           </a:p>
@@ -1157,7 +1157,7 @@
           <a:p>
             <a:fld id="{A881878F-9A12-42FD-A084-B13F414915E6}" type="datetimeFigureOut">
               <a:rPr lang="en-US" smtClean="0"/>
-              <a:t>8/19/2022</a:t>
+              <a:t>9/2/2023</a:t>
             </a:fld>
             <a:endParaRPr lang="en-US"/>
           </a:p>
@@ -1422,7 +1422,7 @@
           <a:p>
             <a:fld id="{A881878F-9A12-42FD-A084-B13F414915E6}" type="datetimeFigureOut">
               <a:rPr lang="en-US" smtClean="0"/>
-              <a:t>8/19/2022</a:t>
+              <a:t>9/2/2023</a:t>
             </a:fld>
             <a:endParaRPr lang="en-US"/>
           </a:p>
@@ -1834,7 +1834,7 @@
           <a:p>
             <a:fld id="{A881878F-9A12-42FD-A084-B13F414915E6}" type="datetimeFigureOut">
               <a:rPr lang="en-US" smtClean="0"/>
-              <a:t>8/19/2022</a:t>
+              <a:t>9/2/2023</a:t>
             </a:fld>
             <a:endParaRPr lang="en-US"/>
           </a:p>
@@ -1975,7 +1975,7 @@
           <a:p>
             <a:fld id="{A881878F-9A12-42FD-A084-B13F414915E6}" type="datetimeFigureOut">
               <a:rPr lang="en-US" smtClean="0"/>
-              <a:t>8/19/2022</a:t>
+              <a:t>9/2/2023</a:t>
             </a:fld>
             <a:endParaRPr lang="en-US"/>
           </a:p>
@@ -2088,7 +2088,7 @@
           <a:p>
             <a:fld id="{A881878F-9A12-42FD-A084-B13F414915E6}" type="datetimeFigureOut">
               <a:rPr lang="en-US" smtClean="0"/>
-              <a:t>8/19/2022</a:t>
+              <a:t>9/2/2023</a:t>
             </a:fld>
             <a:endParaRPr lang="en-US"/>
           </a:p>
@@ -2399,7 +2399,7 @@
           <a:p>
             <a:fld id="{A881878F-9A12-42FD-A084-B13F414915E6}" type="datetimeFigureOut">
               <a:rPr lang="en-US" smtClean="0"/>
-              <a:t>8/19/2022</a:t>
+              <a:t>9/2/2023</a:t>
             </a:fld>
             <a:endParaRPr lang="en-US"/>
           </a:p>
@@ -2687,7 +2687,7 @@
           <a:p>
             <a:fld id="{A881878F-9A12-42FD-A084-B13F414915E6}" type="datetimeFigureOut">
               <a:rPr lang="en-US" smtClean="0"/>
-              <a:t>8/19/2022</a:t>
+              <a:t>9/2/2023</a:t>
             </a:fld>
             <a:endParaRPr lang="en-US"/>
           </a:p>
@@ -2928,7 +2928,7 @@
           <a:p>
             <a:fld id="{A881878F-9A12-42FD-A084-B13F414915E6}" type="datetimeFigureOut">
               <a:rPr lang="en-US" smtClean="0"/>
-              <a:t>8/19/2022</a:t>
+              <a:t>9/2/2023</a:t>
             </a:fld>
             <a:endParaRPr lang="en-US"/>
           </a:p>
@@ -3361,7 +3361,7 @@
         </p:nvCxnSpPr>
         <p:spPr>
           <a:xfrm flipH="1">
-            <a:off x="5090816" y="1493635"/>
+            <a:off x="4684938" y="1419833"/>
             <a:ext cx="4980" cy="469712"/>
           </a:xfrm>
           <a:prstGeom prst="line">
@@ -3405,7 +3405,7 @@
         </p:nvCxnSpPr>
         <p:spPr>
           <a:xfrm flipH="1">
-            <a:off x="6416532" y="1555563"/>
+            <a:off x="6010654" y="1481761"/>
             <a:ext cx="4980" cy="469712"/>
           </a:xfrm>
           <a:prstGeom prst="line">
@@ -3447,7 +3447,7 @@
         </p:nvCxnSpPr>
         <p:spPr>
           <a:xfrm>
-            <a:off x="3949598" y="2362964"/>
+            <a:off x="3543720" y="2289162"/>
             <a:ext cx="3657560" cy="0"/>
           </a:xfrm>
           <a:prstGeom prst="line">
@@ -3490,7 +3490,7 @@
         </p:nvCxnSpPr>
         <p:spPr>
           <a:xfrm>
-            <a:off x="1663578" y="4191744"/>
+            <a:off x="1257700" y="4117942"/>
             <a:ext cx="8229600" cy="0"/>
           </a:xfrm>
           <a:prstGeom prst="line">
@@ -3531,7 +3531,7 @@
         </p:nvCxnSpPr>
         <p:spPr>
           <a:xfrm>
-            <a:off x="3949598" y="1905744"/>
+            <a:off x="3543720" y="1831942"/>
             <a:ext cx="0" cy="914400"/>
           </a:xfrm>
           <a:prstGeom prst="line">
@@ -3568,7 +3568,7 @@
         </p:nvCxnSpPr>
         <p:spPr>
           <a:xfrm>
-            <a:off x="7607178" y="1905744"/>
+            <a:off x="7201300" y="1831942"/>
             <a:ext cx="0" cy="914400"/>
           </a:xfrm>
           <a:prstGeom prst="line">
@@ -3605,7 +3605,7 @@
         </p:nvCxnSpPr>
         <p:spPr>
           <a:xfrm>
-            <a:off x="1663578" y="3687220"/>
+            <a:off x="1257700" y="3613418"/>
             <a:ext cx="0" cy="914400"/>
           </a:xfrm>
           <a:prstGeom prst="line">
@@ -3642,7 +3642,7 @@
         </p:nvCxnSpPr>
         <p:spPr>
           <a:xfrm>
-            <a:off x="9893178" y="3687220"/>
+            <a:off x="9487300" y="3613418"/>
             <a:ext cx="0" cy="914400"/>
           </a:xfrm>
           <a:prstGeom prst="line">
@@ -3679,7 +3679,7 @@
         </p:nvSpPr>
         <p:spPr>
           <a:xfrm>
-            <a:off x="4863978" y="2134344"/>
+            <a:off x="4458100" y="2060542"/>
             <a:ext cx="457200" cy="457200"/>
           </a:xfrm>
           <a:prstGeom prst="ellipse">
@@ -3726,7 +3726,7 @@
         </p:nvSpPr>
         <p:spPr>
           <a:xfrm>
-            <a:off x="6235557" y="2134344"/>
+            <a:off x="5829679" y="2060542"/>
             <a:ext cx="457200" cy="457200"/>
           </a:xfrm>
           <a:prstGeom prst="ellipse">
@@ -3773,7 +3773,7 @@
         </p:nvSpPr>
         <p:spPr>
           <a:xfrm>
-            <a:off x="3949578" y="3963144"/>
+            <a:off x="3543700" y="3889342"/>
             <a:ext cx="457200" cy="457200"/>
           </a:xfrm>
           <a:prstGeom prst="ellipse">
@@ -3820,7 +3820,7 @@
         </p:nvSpPr>
         <p:spPr>
           <a:xfrm>
-            <a:off x="7149979" y="3963144"/>
+            <a:off x="6744101" y="3889342"/>
             <a:ext cx="457200" cy="457200"/>
           </a:xfrm>
           <a:prstGeom prst="ellipse">
@@ -3853,8 +3853,8 @@
           </a:p>
         </p:txBody>
       </p:sp>
-      <mc:AlternateContent xmlns:mc="http://schemas.openxmlformats.org/markup-compatibility/2006" xmlns:a14="http://schemas.microsoft.com/office/drawing/2010/main">
-        <mc:Choice Requires="a14">
+      <mc:AlternateContent xmlns:mc="http://schemas.openxmlformats.org/markup-compatibility/2006">
+        <mc:Choice xmlns:a14="http://schemas.microsoft.com/office/drawing/2010/main" Requires="a14">
           <p:sp>
             <p:nvSpPr>
               <p:cNvPr id="21" name="TextBox 20">
@@ -3869,7 +3869,7 @@
             </p:nvSpPr>
             <p:spPr>
               <a:xfrm>
-                <a:off x="832660" y="2039778"/>
+                <a:off x="426782" y="1965976"/>
                 <a:ext cx="715196" cy="646331"/>
               </a:xfrm>
               <a:prstGeom prst="rect">
@@ -3936,7 +3936,7 @@
             </p:txBody>
           </p:sp>
         </mc:Choice>
-        <mc:Fallback xmlns="">
+        <mc:Fallback>
           <p:sp>
             <p:nvSpPr>
               <p:cNvPr id="21" name="TextBox 20">
@@ -3953,7 +3953,7 @@
             </p:nvSpPr>
             <p:spPr>
               <a:xfrm>
-                <a:off x="832660" y="2039778"/>
+                <a:off x="426782" y="1965976"/>
                 <a:ext cx="715196" cy="646331"/>
               </a:xfrm>
               <a:prstGeom prst="rect">
@@ -3981,8 +3981,8 @@
           </p:sp>
         </mc:Fallback>
       </mc:AlternateContent>
-      <mc:AlternateContent xmlns:mc="http://schemas.openxmlformats.org/markup-compatibility/2006" xmlns:a14="http://schemas.microsoft.com/office/drawing/2010/main">
-        <mc:Choice Requires="a14">
+      <mc:AlternateContent xmlns:mc="http://schemas.openxmlformats.org/markup-compatibility/2006">
+        <mc:Choice xmlns:a14="http://schemas.microsoft.com/office/drawing/2010/main" Requires="a14">
           <p:sp>
             <p:nvSpPr>
               <p:cNvPr id="22" name="TextBox 21">
@@ -3997,7 +3997,7 @@
             </p:nvSpPr>
             <p:spPr>
               <a:xfrm>
-                <a:off x="822825" y="3821254"/>
+                <a:off x="416947" y="3747452"/>
                 <a:ext cx="715196" cy="646331"/>
               </a:xfrm>
               <a:prstGeom prst="rect">
@@ -4064,7 +4064,7 @@
             </p:txBody>
           </p:sp>
         </mc:Choice>
-        <mc:Fallback xmlns="">
+        <mc:Fallback>
           <p:sp>
             <p:nvSpPr>
               <p:cNvPr id="22" name="TextBox 21">
@@ -4081,7 +4081,7 @@
             </p:nvSpPr>
             <p:spPr>
               <a:xfrm>
-                <a:off x="822825" y="3821254"/>
+                <a:off x="416947" y="3747452"/>
                 <a:ext cx="715196" cy="646331"/>
               </a:xfrm>
               <a:prstGeom prst="rect">
@@ -4109,8 +4109,8 @@
           </p:sp>
         </mc:Fallback>
       </mc:AlternateContent>
-      <mc:AlternateContent xmlns:mc="http://schemas.openxmlformats.org/markup-compatibility/2006" xmlns:a14="http://schemas.microsoft.com/office/drawing/2010/main">
-        <mc:Choice Requires="a14">
+      <mc:AlternateContent xmlns:mc="http://schemas.openxmlformats.org/markup-compatibility/2006">
+        <mc:Choice xmlns:a14="http://schemas.microsoft.com/office/drawing/2010/main" Requires="a14">
           <p:sp>
             <p:nvSpPr>
               <p:cNvPr id="25" name="TextBox 24">
@@ -4125,8 +4125,8 @@
             </p:nvSpPr>
             <p:spPr>
               <a:xfrm>
-                <a:off x="2960703" y="1247417"/>
-                <a:ext cx="1941878" cy="657616"/>
+                <a:off x="2895650" y="1038210"/>
+                <a:ext cx="1753300" cy="653449"/>
               </a:xfrm>
               <a:prstGeom prst="rect">
                 <a:avLst/>
@@ -4196,7 +4196,7 @@
                               </a:solidFill>
                               <a:latin typeface="Cambria Math" panose="02040503050406030204" pitchFamily="18" charset="0"/>
                             </a:rPr>
-                            <m:t>𝐵</m:t>
+                            <m:t>𝑡</m:t>
                           </m:r>
                         </m:sup>
                       </m:sSubSup>
@@ -4250,7 +4250,7 @@
                               </a:solidFill>
                               <a:latin typeface="Cambria Math" panose="02040503050406030204" pitchFamily="18" charset="0"/>
                             </a:rPr>
-                            <m:t>𝑀</m:t>
+                            <m:t>𝑟</m:t>
                           </m:r>
                         </m:sup>
                       </m:sSubSup>
@@ -4271,7 +4271,7 @@
             </p:txBody>
           </p:sp>
         </mc:Choice>
-        <mc:Fallback xmlns="">
+        <mc:Fallback>
           <p:sp>
             <p:nvSpPr>
               <p:cNvPr id="25" name="TextBox 24">
@@ -4288,8 +4288,8 @@
             </p:nvSpPr>
             <p:spPr>
               <a:xfrm>
-                <a:off x="2960703" y="1247417"/>
-                <a:ext cx="1941878" cy="657616"/>
+                <a:off x="2895650" y="1038210"/>
+                <a:ext cx="1753300" cy="653449"/>
               </a:xfrm>
               <a:prstGeom prst="rect">
                 <a:avLst/>
@@ -4316,8 +4316,8 @@
           </p:sp>
         </mc:Fallback>
       </mc:AlternateContent>
-      <mc:AlternateContent xmlns:mc="http://schemas.openxmlformats.org/markup-compatibility/2006" xmlns:a14="http://schemas.microsoft.com/office/drawing/2010/main">
-        <mc:Choice Requires="a14">
+      <mc:AlternateContent xmlns:mc="http://schemas.openxmlformats.org/markup-compatibility/2006">
+        <mc:Choice xmlns:a14="http://schemas.microsoft.com/office/drawing/2010/main" Requires="a14">
           <p:sp>
             <p:nvSpPr>
               <p:cNvPr id="28" name="TextBox 27">
@@ -4332,8 +4332,8 @@
             </p:nvSpPr>
             <p:spPr>
               <a:xfrm>
-                <a:off x="7604719" y="4214504"/>
-                <a:ext cx="1941878" cy="653897"/>
+                <a:off x="7198841" y="4243128"/>
+                <a:ext cx="1745606" cy="648896"/>
               </a:xfrm>
               <a:prstGeom prst="rect">
                 <a:avLst/>
@@ -4415,7 +4415,7 @@
                                   </a:solidFill>
                                   <a:latin typeface="Cambria Math" panose="02040503050406030204" pitchFamily="18" charset="0"/>
                                 </a:rPr>
-                                <m:t>𝐵</m:t>
+                                <m:t>𝑡</m:t>
                               </m:r>
                             </m:sup>
                           </m:sSubSup>
@@ -4457,7 +4457,7 @@
                               </a:solidFill>
                               <a:latin typeface="Cambria Math" panose="02040503050406030204" pitchFamily="18" charset="0"/>
                             </a:rPr>
-                            <m:t>𝑀</m:t>
+                            <m:t>𝑟</m:t>
                           </m:r>
                         </m:sup>
                       </m:sSubSup>
@@ -4478,7 +4478,7 @@
             </p:txBody>
           </p:sp>
         </mc:Choice>
-        <mc:Fallback xmlns="">
+        <mc:Fallback>
           <p:sp>
             <p:nvSpPr>
               <p:cNvPr id="28" name="TextBox 27">
@@ -4495,8 +4495,8 @@
             </p:nvSpPr>
             <p:spPr>
               <a:xfrm>
-                <a:off x="7604719" y="4214504"/>
-                <a:ext cx="1941878" cy="653897"/>
+                <a:off x="7198841" y="4243128"/>
+                <a:ext cx="1745606" cy="648896"/>
               </a:xfrm>
               <a:prstGeom prst="rect">
                 <a:avLst/>
@@ -4539,7 +4539,7 @@
         </p:nvCxnSpPr>
         <p:spPr>
           <a:xfrm>
-            <a:off x="5090120" y="2362944"/>
+            <a:off x="4684242" y="2289142"/>
             <a:ext cx="2288459" cy="1828800"/>
           </a:xfrm>
           <a:prstGeom prst="straightConnector1">
@@ -4585,7 +4585,7 @@
         </p:nvCxnSpPr>
         <p:spPr>
           <a:xfrm flipH="1" flipV="1">
-            <a:off x="5090121" y="5106145"/>
+            <a:off x="4684243" y="5032343"/>
             <a:ext cx="2288458" cy="12738"/>
           </a:xfrm>
           <a:prstGeom prst="straightConnector1">
@@ -4614,8 +4614,8 @@
           </a:fontRef>
         </p:style>
       </p:cxnSp>
-      <mc:AlternateContent xmlns:mc="http://schemas.openxmlformats.org/markup-compatibility/2006" xmlns:a14="http://schemas.microsoft.com/office/drawing/2010/main">
-        <mc:Choice Requires="a14">
+      <mc:AlternateContent xmlns:mc="http://schemas.openxmlformats.org/markup-compatibility/2006">
+        <mc:Choice xmlns:a14="http://schemas.microsoft.com/office/drawing/2010/main" Requires="a14">
           <p:sp>
             <p:nvSpPr>
               <p:cNvPr id="43" name="TextBox 42">
@@ -4630,8 +4630,8 @@
             </p:nvSpPr>
             <p:spPr>
               <a:xfrm>
-                <a:off x="5671192" y="4380713"/>
-                <a:ext cx="1123769" cy="645113"/>
+                <a:off x="5265314" y="4306911"/>
+                <a:ext cx="809901" cy="633571"/>
               </a:xfrm>
               <a:prstGeom prst="rect">
                 <a:avLst/>
@@ -4663,40 +4663,15 @@
                         </a:rPr>
                         <m:t>Δ</m:t>
                       </m:r>
-                      <m:sSup>
-                        <m:sSupPr>
-                          <m:ctrlPr>
-                            <a:rPr lang="en-US" sz="3600" b="0" i="1" dirty="0" smtClean="0">
-                              <a:solidFill>
-                                <a:srgbClr val="FF00FF"/>
-                              </a:solidFill>
-                              <a:latin typeface="Cambria Math" panose="02040503050406030204" pitchFamily="18" charset="0"/>
-                            </a:rPr>
-                          </m:ctrlPr>
-                        </m:sSupPr>
-                        <m:e>
-                          <m:r>
-                            <a:rPr lang="en-US" sz="3600" b="0" i="1" dirty="0" smtClean="0">
-                              <a:solidFill>
-                                <a:srgbClr val="FF00FF"/>
-                              </a:solidFill>
-                              <a:latin typeface="Cambria Math" panose="02040503050406030204" pitchFamily="18" charset="0"/>
-                            </a:rPr>
-                            <m:t>𝑥</m:t>
-                          </m:r>
-                        </m:e>
-                        <m:sup>
-                          <m:r>
-                            <a:rPr lang="en-US" sz="3600" b="0" i="1" dirty="0" smtClean="0">
-                              <a:solidFill>
-                                <a:srgbClr val="FF00FF"/>
-                              </a:solidFill>
-                              <a:latin typeface="Cambria Math" panose="02040503050406030204" pitchFamily="18" charset="0"/>
-                            </a:rPr>
-                            <m:t>𝑀</m:t>
-                          </m:r>
-                        </m:sup>
-                      </m:sSup>
+                      <m:r>
+                        <a:rPr lang="en-US" sz="3600" b="0" i="1" dirty="0" smtClean="0">
+                          <a:solidFill>
+                            <a:srgbClr val="FF00FF"/>
+                          </a:solidFill>
+                          <a:latin typeface="Cambria Math" panose="02040503050406030204" pitchFamily="18" charset="0"/>
+                        </a:rPr>
+                        <m:t>𝜎</m:t>
+                      </m:r>
                     </m:oMath>
                   </m:oMathPara>
                 </a14:m>
@@ -4705,7 +4680,7 @@
             </p:txBody>
           </p:sp>
         </mc:Choice>
-        <mc:Fallback xmlns="">
+        <mc:Fallback>
           <p:sp>
             <p:nvSpPr>
               <p:cNvPr id="43" name="TextBox 42">
@@ -4722,8 +4697,8 @@
             </p:nvSpPr>
             <p:spPr>
               <a:xfrm>
-                <a:off x="5671192" y="4380713"/>
-                <a:ext cx="1123769" cy="645113"/>
+                <a:off x="5265314" y="4306911"/>
+                <a:ext cx="809901" cy="633571"/>
               </a:xfrm>
               <a:prstGeom prst="rect">
                 <a:avLst/>
@@ -4766,7 +4741,7 @@
         </p:nvCxnSpPr>
         <p:spPr>
           <a:xfrm>
-            <a:off x="5090120" y="2747665"/>
+            <a:off x="4684242" y="2673863"/>
             <a:ext cx="0" cy="2267030"/>
           </a:xfrm>
           <a:prstGeom prst="line">
@@ -4810,7 +4785,7 @@
         </p:nvCxnSpPr>
         <p:spPr>
           <a:xfrm flipH="1">
-            <a:off x="7378579" y="4576465"/>
+            <a:off x="6972701" y="4502663"/>
             <a:ext cx="1" cy="438230"/>
           </a:xfrm>
           <a:prstGeom prst="line">
@@ -4854,8 +4829,8 @@
         </p:nvCxnSpPr>
         <p:spPr>
           <a:xfrm>
-            <a:off x="7790036" y="2362944"/>
-            <a:ext cx="3091079" cy="0"/>
+            <a:off x="7384158" y="2289142"/>
+            <a:ext cx="4289621" cy="0"/>
           </a:xfrm>
           <a:prstGeom prst="line">
             <a:avLst/>
@@ -4898,8 +4873,8 @@
         </p:nvCxnSpPr>
         <p:spPr>
           <a:xfrm flipV="1">
-            <a:off x="9984572" y="4180309"/>
-            <a:ext cx="896543" cy="11435"/>
+            <a:off x="9578694" y="4106506"/>
+            <a:ext cx="2095085" cy="11436"/>
           </a:xfrm>
           <a:prstGeom prst="line">
             <a:avLst/>
@@ -4942,8 +4917,8 @@
             </p:nvSpPr>
             <p:spPr>
               <a:xfrm>
-                <a:off x="5181610" y="3429000"/>
-                <a:ext cx="1234921" cy="645113"/>
+                <a:off x="4981206" y="3118548"/>
+                <a:ext cx="1234921" cy="633571"/>
               </a:xfrm>
               <a:prstGeom prst="rect">
                 <a:avLst/>
@@ -4972,49 +4947,15 @@
                         </a:rPr>
                         <m:t>Δ</m:t>
                       </m:r>
-                      <m:sSup>
-                        <m:sSupPr>
-                          <m:ctrlPr>
-                            <a:rPr lang="en-US" sz="3600" b="0" i="1" dirty="0" smtClean="0">
-                              <a:solidFill>
-                                <a:schemeClr val="tx1"/>
-                              </a:solidFill>
-                              <a:latin typeface="Cambria Math" panose="02040503050406030204" pitchFamily="18" charset="0"/>
-                            </a:rPr>
-                          </m:ctrlPr>
-                        </m:sSupPr>
-                        <m:e>
-                          <m:r>
-                            <a:rPr lang="en-US" sz="3600" b="0" i="1" dirty="0" smtClean="0">
-                              <a:solidFill>
-                                <a:schemeClr val="tx1"/>
-                              </a:solidFill>
-                              <a:latin typeface="Cambria Math" panose="02040503050406030204" pitchFamily="18" charset="0"/>
-                            </a:rPr>
-                            <m:t>𝑠</m:t>
-                          </m:r>
-                        </m:e>
-                        <m:sup>
-                          <m:r>
-                            <a:rPr lang="en-US" sz="3600" b="0" i="1" dirty="0" smtClean="0">
-                              <a:solidFill>
-                                <a:schemeClr val="tx1"/>
-                              </a:solidFill>
-                              <a:latin typeface="Cambria Math" panose="02040503050406030204" pitchFamily="18" charset="0"/>
-                            </a:rPr>
-                            <m:t>𝑀</m:t>
-                          </m:r>
-                          <m:r>
-                            <a:rPr lang="en-US" sz="3600" b="0" i="1" dirty="0" smtClean="0">
-                              <a:solidFill>
-                                <a:schemeClr val="tx1"/>
-                              </a:solidFill>
-                              <a:latin typeface="Cambria Math" panose="02040503050406030204" pitchFamily="18" charset="0"/>
-                            </a:rPr>
-                            <m:t>𝐵</m:t>
-                          </m:r>
-                        </m:sup>
-                      </m:sSup>
+                      <m:r>
+                        <a:rPr lang="en-US" sz="3600" b="0" i="1" dirty="0" smtClean="0">
+                          <a:solidFill>
+                            <a:schemeClr val="tx1"/>
+                          </a:solidFill>
+                          <a:latin typeface="Cambria Math" panose="02040503050406030204" pitchFamily="18" charset="0"/>
+                        </a:rPr>
+                        <m:t>𝑠</m:t>
+                      </m:r>
                     </m:oMath>
                   </m:oMathPara>
                 </a14:m>
@@ -5044,8 +4985,8 @@
             </p:nvSpPr>
             <p:spPr>
               <a:xfrm>
-                <a:off x="5181610" y="3429000"/>
-                <a:ext cx="1234921" cy="645113"/>
+                <a:off x="4981206" y="3118548"/>
+                <a:ext cx="1234921" cy="633571"/>
               </a:xfrm>
               <a:prstGeom prst="rect">
                 <a:avLst/>
@@ -5072,8 +5013,8 @@
           </p:sp>
         </mc:Fallback>
       </mc:AlternateContent>
-      <mc:AlternateContent xmlns:mc="http://schemas.openxmlformats.org/markup-compatibility/2006" xmlns:a14="http://schemas.microsoft.com/office/drawing/2010/main">
-        <mc:Choice Requires="a14">
+      <mc:AlternateContent xmlns:mc="http://schemas.openxmlformats.org/markup-compatibility/2006">
+        <mc:Choice xmlns:a14="http://schemas.microsoft.com/office/drawing/2010/main" Requires="a14">
           <p:sp>
             <p:nvSpPr>
               <p:cNvPr id="46" name="TextBox 45">
@@ -5088,8 +5029,8 @@
             </p:nvSpPr>
             <p:spPr>
               <a:xfrm>
-                <a:off x="5387084" y="5271649"/>
-                <a:ext cx="1123769" cy="657616"/>
+                <a:off x="4981206" y="5197847"/>
+                <a:ext cx="1007648" cy="633571"/>
               </a:xfrm>
               <a:prstGeom prst="rect">
                 <a:avLst/>
@@ -5162,7 +5103,7 @@
                               </a:solidFill>
                               <a:latin typeface="Cambria Math" panose="02040503050406030204" pitchFamily="18" charset="0"/>
                             </a:rPr>
-                            <m:t>𝑀</m:t>
+                            <m:t>𝑟</m:t>
                           </m:r>
                         </m:sup>
                       </m:sSubSup>
@@ -5174,7 +5115,7 @@
             </p:txBody>
           </p:sp>
         </mc:Choice>
-        <mc:Fallback xmlns="">
+        <mc:Fallback>
           <p:sp>
             <p:nvSpPr>
               <p:cNvPr id="46" name="TextBox 45">
@@ -5191,8 +5132,8 @@
             </p:nvSpPr>
             <p:spPr>
               <a:xfrm>
-                <a:off x="5387084" y="5271649"/>
-                <a:ext cx="1123769" cy="657616"/>
+                <a:off x="4981206" y="5197847"/>
+                <a:ext cx="1007648" cy="633571"/>
               </a:xfrm>
               <a:prstGeom prst="rect">
                 <a:avLst/>
@@ -5235,7 +5176,7 @@
         </p:nvCxnSpPr>
         <p:spPr>
           <a:xfrm flipH="1">
-            <a:off x="4178178" y="5972887"/>
+            <a:off x="3772300" y="5899085"/>
             <a:ext cx="3207648" cy="9238"/>
           </a:xfrm>
           <a:prstGeom prst="straightConnector1">
@@ -5264,8 +5205,8 @@
           </a:fontRef>
         </p:style>
       </p:cxnSp>
-      <mc:AlternateContent xmlns:mc="http://schemas.openxmlformats.org/markup-compatibility/2006" xmlns:a14="http://schemas.microsoft.com/office/drawing/2010/main">
-        <mc:Choice Requires="a14">
+      <mc:AlternateContent xmlns:mc="http://schemas.openxmlformats.org/markup-compatibility/2006">
+        <mc:Choice xmlns:a14="http://schemas.microsoft.com/office/drawing/2010/main" Requires="a14">
           <p:sp>
             <p:nvSpPr>
               <p:cNvPr id="51" name="TextBox 50">
@@ -5280,8 +5221,8 @@
             </p:nvSpPr>
             <p:spPr>
               <a:xfrm>
-                <a:off x="5387084" y="752479"/>
-                <a:ext cx="1123769" cy="653256"/>
+                <a:off x="4981206" y="678677"/>
+                <a:ext cx="1007648" cy="637419"/>
               </a:xfrm>
               <a:prstGeom prst="rect">
                 <a:avLst/>
@@ -5354,7 +5295,7 @@
                               </a:solidFill>
                               <a:latin typeface="Cambria Math" panose="02040503050406030204" pitchFamily="18" charset="0"/>
                             </a:rPr>
-                            <m:t>𝑀</m:t>
+                            <m:t>𝑟</m:t>
                           </m:r>
                         </m:sup>
                       </m:sSubSup>
@@ -5366,7 +5307,7 @@
             </p:txBody>
           </p:sp>
         </mc:Choice>
-        <mc:Fallback xmlns="">
+        <mc:Fallback>
           <p:sp>
             <p:nvSpPr>
               <p:cNvPr id="51" name="TextBox 50">
@@ -5383,8 +5324,8 @@
             </p:nvSpPr>
             <p:spPr>
               <a:xfrm>
-                <a:off x="5387084" y="752479"/>
-                <a:ext cx="1123769" cy="653256"/>
+                <a:off x="4981206" y="678677"/>
+                <a:ext cx="1007648" cy="637419"/>
               </a:xfrm>
               <a:prstGeom prst="rect">
                 <a:avLst/>
@@ -5427,7 +5368,7 @@
         </p:nvCxnSpPr>
         <p:spPr>
           <a:xfrm flipH="1" flipV="1">
-            <a:off x="5090120" y="1456534"/>
+            <a:off x="4684242" y="1382732"/>
             <a:ext cx="1326412" cy="26034"/>
           </a:xfrm>
           <a:prstGeom prst="straightConnector1">
@@ -5472,7 +5413,7 @@
         </p:nvCxnSpPr>
         <p:spPr>
           <a:xfrm>
-            <a:off x="4150076" y="4541453"/>
+            <a:off x="3744198" y="4467651"/>
             <a:ext cx="0" cy="1431434"/>
           </a:xfrm>
           <a:prstGeom prst="line">
@@ -5516,7 +5457,7 @@
         </p:nvCxnSpPr>
         <p:spPr>
           <a:xfrm>
-            <a:off x="7385826" y="5257170"/>
+            <a:off x="6979948" y="5183368"/>
             <a:ext cx="0" cy="607253"/>
           </a:xfrm>
           <a:prstGeom prst="line">
@@ -5544,8 +5485,8 @@
           </a:fontRef>
         </p:style>
       </p:cxnSp>
-      <mc:AlternateContent xmlns:mc="http://schemas.openxmlformats.org/markup-compatibility/2006" xmlns:a14="http://schemas.microsoft.com/office/drawing/2010/main">
-        <mc:Choice Requires="a14">
+      <mc:AlternateContent xmlns:mc="http://schemas.openxmlformats.org/markup-compatibility/2006">
+        <mc:Choice xmlns:a14="http://schemas.microsoft.com/office/drawing/2010/main" Requires="a14">
           <p:sp>
             <p:nvSpPr>
               <p:cNvPr id="38" name="TextBox 37">
@@ -5560,7 +5501,7 @@
             </p:nvSpPr>
             <p:spPr>
               <a:xfrm>
-                <a:off x="4114521" y="2590833"/>
+                <a:off x="3833299" y="2291817"/>
                 <a:ext cx="746999" cy="646331"/>
               </a:xfrm>
               <a:prstGeom prst="rect">
@@ -5614,7 +5555,7 @@
             </p:txBody>
           </p:sp>
         </mc:Choice>
-        <mc:Fallback xmlns="">
+        <mc:Fallback>
           <p:sp>
             <p:nvSpPr>
               <p:cNvPr id="38" name="TextBox 37">
@@ -5631,7 +5572,7 @@
             </p:nvSpPr>
             <p:spPr>
               <a:xfrm>
-                <a:off x="4114521" y="2590833"/>
+                <a:off x="3833299" y="2291817"/>
                 <a:ext cx="746999" cy="646331"/>
               </a:xfrm>
               <a:prstGeom prst="rect">
@@ -5659,8 +5600,8 @@
           </p:sp>
         </mc:Fallback>
       </mc:AlternateContent>
-      <mc:AlternateContent xmlns:mc="http://schemas.openxmlformats.org/markup-compatibility/2006" xmlns:a14="http://schemas.microsoft.com/office/drawing/2010/main">
-        <mc:Choice Requires="a14">
+      <mc:AlternateContent xmlns:mc="http://schemas.openxmlformats.org/markup-compatibility/2006">
+        <mc:Choice xmlns:a14="http://schemas.microsoft.com/office/drawing/2010/main" Requires="a14">
           <p:sp>
             <p:nvSpPr>
               <p:cNvPr id="39" name="TextBox 38">
@@ -5675,7 +5616,7 @@
             </p:nvSpPr>
             <p:spPr>
               <a:xfrm>
-                <a:off x="7829587" y="3316733"/>
+                <a:off x="7145068" y="3410055"/>
                 <a:ext cx="740972" cy="646331"/>
               </a:xfrm>
               <a:prstGeom prst="rect">
@@ -5729,7 +5670,7 @@
             </p:txBody>
           </p:sp>
         </mc:Choice>
-        <mc:Fallback xmlns="">
+        <mc:Fallback>
           <p:sp>
             <p:nvSpPr>
               <p:cNvPr id="39" name="TextBox 38">
@@ -5746,7 +5687,7 @@
             </p:nvSpPr>
             <p:spPr>
               <a:xfrm>
-                <a:off x="7829587" y="3316733"/>
+                <a:off x="7145068" y="3410055"/>
                 <a:ext cx="740972" cy="646331"/>
               </a:xfrm>
               <a:prstGeom prst="rect">
@@ -5790,7 +5731,7 @@
         </p:nvCxnSpPr>
         <p:spPr>
           <a:xfrm>
-            <a:off x="10419088" y="2357227"/>
+            <a:off x="9868272" y="2283425"/>
             <a:ext cx="0" cy="1828800"/>
           </a:xfrm>
           <a:prstGeom prst="straightConnector1">
@@ -5819,8 +5760,8 @@
           </a:fontRef>
         </p:style>
       </p:cxnSp>
-      <mc:AlternateContent xmlns:mc="http://schemas.openxmlformats.org/markup-compatibility/2006" xmlns:a14="http://schemas.microsoft.com/office/drawing/2010/main">
-        <mc:Choice Requires="a14">
+      <mc:AlternateContent xmlns:mc="http://schemas.openxmlformats.org/markup-compatibility/2006">
+        <mc:Choice xmlns:a14="http://schemas.microsoft.com/office/drawing/2010/main" Requires="a14">
           <p:sp>
             <p:nvSpPr>
               <p:cNvPr id="44" name="TextBox 43">
@@ -5835,8 +5776,164 @@
             </p:nvSpPr>
             <p:spPr>
               <a:xfrm>
-                <a:off x="10423920" y="2948461"/>
-                <a:ext cx="1059328" cy="646331"/>
+                <a:off x="9882939" y="2874659"/>
+                <a:ext cx="693572" cy="646331"/>
+              </a:xfrm>
+              <a:prstGeom prst="rect">
+                <a:avLst/>
+              </a:prstGeom>
+              <a:noFill/>
+            </p:spPr>
+            <p:txBody>
+              <a:bodyPr wrap="square" rtlCol="0">
+                <a:spAutoFit/>
+              </a:bodyPr>
+              <a:lstStyle/>
+              <a:p>
+                <a:pPr/>
+                <a14:m>
+                  <m:oMathPara xmlns:m="http://schemas.openxmlformats.org/officeDocument/2006/math">
+                    <m:oMathParaPr>
+                      <m:jc m:val="centerGroup"/>
+                    </m:oMathParaPr>
+                    <m:oMath xmlns:m="http://schemas.openxmlformats.org/officeDocument/2006/math">
+                      <m:r>
+                        <m:rPr>
+                          <m:sty m:val="p"/>
+                        </m:rPr>
+                        <a:rPr lang="en-US" sz="3600" b="0" i="0" dirty="0" smtClean="0">
+                          <a:solidFill>
+                            <a:srgbClr val="0000FF"/>
+                          </a:solidFill>
+                          <a:latin typeface="Cambria Math" panose="02040503050406030204" pitchFamily="18" charset="0"/>
+                        </a:rPr>
+                        <m:t>Δ</m:t>
+                      </m:r>
+                      <m:r>
+                        <a:rPr lang="en-US" sz="3600" b="0" i="1" dirty="0" smtClean="0">
+                          <a:solidFill>
+                            <a:srgbClr val="0000FF"/>
+                          </a:solidFill>
+                          <a:latin typeface="Cambria Math" panose="02040503050406030204" pitchFamily="18" charset="0"/>
+                        </a:rPr>
+                        <m:t>𝜏</m:t>
+                      </m:r>
+                    </m:oMath>
+                  </m:oMathPara>
+                </a14:m>
+                <a:endParaRPr lang="en-US" sz="3600" dirty="0"/>
+              </a:p>
+            </p:txBody>
+          </p:sp>
+        </mc:Choice>
+        <mc:Fallback>
+          <p:sp>
+            <p:nvSpPr>
+              <p:cNvPr id="44" name="TextBox 43">
+                <a:extLst>
+                  <a:ext uri="{FF2B5EF4-FFF2-40B4-BE49-F238E27FC236}">
+                    <a16:creationId xmlns:a16="http://schemas.microsoft.com/office/drawing/2014/main" id="{98A04AD3-5CA2-55D6-5AD0-BF6621B501B6}"/>
+                  </a:ext>
+                </a:extLst>
+              </p:cNvPr>
+              <p:cNvSpPr txBox="1">
+                <a:spLocks noRot="1" noChangeAspect="1" noMove="1" noResize="1" noEditPoints="1" noAdjustHandles="1" noChangeArrowheads="1" noChangeShapeType="1" noTextEdit="1"/>
+              </p:cNvSpPr>
+              <p:nvPr/>
+            </p:nvSpPr>
+            <p:spPr>
+              <a:xfrm>
+                <a:off x="9882939" y="2874659"/>
+                <a:ext cx="693572" cy="646331"/>
+              </a:xfrm>
+              <a:prstGeom prst="rect">
+                <a:avLst/>
+              </a:prstGeom>
+              <a:blipFill>
+                <a:blip r:embed="rId12"/>
+                <a:stretch>
+                  <a:fillRect/>
+                </a:stretch>
+              </a:blipFill>
+            </p:spPr>
+            <p:txBody>
+              <a:bodyPr/>
+              <a:lstStyle/>
+              <a:p>
+                <a:r>
+                  <a:rPr lang="en-US">
+                    <a:noFill/>
+                  </a:rPr>
+                  <a:t> </a:t>
+                </a:r>
+              </a:p>
+            </p:txBody>
+          </p:sp>
+        </mc:Fallback>
+      </mc:AlternateContent>
+      <p:cxnSp>
+        <p:nvCxnSpPr>
+          <p:cNvPr id="7" name="Straight Arrow Connector 6">
+            <a:extLst>
+              <a:ext uri="{FF2B5EF4-FFF2-40B4-BE49-F238E27FC236}">
+                <a16:creationId xmlns:a16="http://schemas.microsoft.com/office/drawing/2014/main" id="{71583E23-6EC0-2197-79F9-C43A92725974}"/>
+              </a:ext>
+            </a:extLst>
+          </p:cNvPr>
+          <p:cNvCxnSpPr>
+            <a:cxnSpLocks/>
+          </p:cNvCxnSpPr>
+          <p:nvPr/>
+        </p:nvCxnSpPr>
+        <p:spPr>
+          <a:xfrm>
+            <a:off x="10759389" y="2258736"/>
+            <a:ext cx="0" cy="1828800"/>
+          </a:xfrm>
+          <a:prstGeom prst="straightConnector1">
+            <a:avLst/>
+          </a:prstGeom>
+          <a:ln w="50800">
+            <a:solidFill>
+              <a:schemeClr val="tx1"/>
+            </a:solidFill>
+            <a:headEnd type="triangle"/>
+            <a:tailEnd type="triangle"/>
+          </a:ln>
+        </p:spPr>
+        <p:style>
+          <a:lnRef idx="1">
+            <a:schemeClr val="accent1"/>
+          </a:lnRef>
+          <a:fillRef idx="0">
+            <a:schemeClr val="accent1"/>
+          </a:fillRef>
+          <a:effectRef idx="0">
+            <a:schemeClr val="accent1"/>
+          </a:effectRef>
+          <a:fontRef idx="minor">
+            <a:schemeClr val="tx1"/>
+          </a:fontRef>
+        </p:style>
+      </p:cxnSp>
+      <mc:AlternateContent xmlns:mc="http://schemas.openxmlformats.org/markup-compatibility/2006">
+        <mc:Choice xmlns:a14="http://schemas.microsoft.com/office/drawing/2010/main" Requires="a14">
+          <p:sp>
+            <p:nvSpPr>
+              <p:cNvPr id="8" name="TextBox 7">
+                <a:extLst>
+                  <a:ext uri="{FF2B5EF4-FFF2-40B4-BE49-F238E27FC236}">
+                    <a16:creationId xmlns:a16="http://schemas.microsoft.com/office/drawing/2014/main" id="{F6D093B2-BF74-93D7-84B0-DD1EEE3D9969}"/>
+                  </a:ext>
+                </a:extLst>
+              </p:cNvPr>
+              <p:cNvSpPr txBox="1"/>
+              <p:nvPr/>
+            </p:nvSpPr>
+            <p:spPr>
+              <a:xfrm>
+                <a:off x="10774055" y="2849970"/>
+                <a:ext cx="876449" cy="646331"/>
               </a:xfrm>
               <a:prstGeom prst="rect">
                 <a:avLst/>
@@ -5881,7 +5978,7 @@
                         </m:sSupPr>
                         <m:e>
                           <m:r>
-                            <a:rPr lang="en-US" sz="3600" b="0" i="1" smtClean="0">
+                            <a:rPr lang="en-US" sz="3600" b="0" i="1" dirty="0" smtClean="0">
                               <a:solidFill>
                                 <a:srgbClr val="0000FF"/>
                               </a:solidFill>
@@ -5898,7 +5995,7 @@
                               </a:solidFill>
                               <a:latin typeface="Cambria Math" panose="02040503050406030204" pitchFamily="18" charset="0"/>
                             </a:rPr>
-                            <m:t>𝐵</m:t>
+                            <m:t>𝑡</m:t>
                           </m:r>
                         </m:sup>
                       </m:sSup>
@@ -5910,13 +6007,13 @@
             </p:txBody>
           </p:sp>
         </mc:Choice>
-        <mc:Fallback xmlns="">
+        <mc:Fallback>
           <p:sp>
             <p:nvSpPr>
-              <p:cNvPr id="44" name="TextBox 43">
+              <p:cNvPr id="8" name="TextBox 7">
                 <a:extLst>
                   <a:ext uri="{FF2B5EF4-FFF2-40B4-BE49-F238E27FC236}">
-                    <a16:creationId xmlns:a16="http://schemas.microsoft.com/office/drawing/2014/main" id="{98A04AD3-5CA2-55D6-5AD0-BF6621B501B6}"/>
+                    <a16:creationId xmlns:a16="http://schemas.microsoft.com/office/drawing/2014/main" id="{F6D093B2-BF74-93D7-84B0-DD1EEE3D9969}"/>
                   </a:ext>
                 </a:extLst>
               </p:cNvPr>
@@ -5927,14 +6024,14 @@
             </p:nvSpPr>
             <p:spPr>
               <a:xfrm>
-                <a:off x="10423920" y="2948461"/>
-                <a:ext cx="1059328" cy="646331"/>
+                <a:off x="10774055" y="2849970"/>
+                <a:ext cx="876449" cy="646331"/>
               </a:xfrm>
               <a:prstGeom prst="rect">
                 <a:avLst/>
               </a:prstGeom>
               <a:blipFill>
-                <a:blip r:embed="rId12"/>
+                <a:blip r:embed="rId13"/>
                 <a:stretch>
                   <a:fillRect/>
                 </a:stretch>

</xml_diff>

<commit_message>
This is a good release candidate.
</commit_message>
<xml_diff>
--- a/Spacetime Interval.pptx
+++ b/Spacetime Interval.pptx
@@ -278,7 +278,7 @@
           <a:p>
             <a:fld id="{A881878F-9A12-42FD-A084-B13F414915E6}" type="datetimeFigureOut">
               <a:rPr lang="en-US" smtClean="0"/>
-              <a:t>9/2/2023</a:t>
+              <a:t>9/21/2023</a:t>
             </a:fld>
             <a:endParaRPr lang="en-US"/>
           </a:p>
@@ -476,7 +476,7 @@
           <a:p>
             <a:fld id="{A881878F-9A12-42FD-A084-B13F414915E6}" type="datetimeFigureOut">
               <a:rPr lang="en-US" smtClean="0"/>
-              <a:t>9/2/2023</a:t>
+              <a:t>9/21/2023</a:t>
             </a:fld>
             <a:endParaRPr lang="en-US"/>
           </a:p>
@@ -684,7 +684,7 @@
           <a:p>
             <a:fld id="{A881878F-9A12-42FD-A084-B13F414915E6}" type="datetimeFigureOut">
               <a:rPr lang="en-US" smtClean="0"/>
-              <a:t>9/2/2023</a:t>
+              <a:t>9/21/2023</a:t>
             </a:fld>
             <a:endParaRPr lang="en-US"/>
           </a:p>
@@ -882,7 +882,7 @@
           <a:p>
             <a:fld id="{A881878F-9A12-42FD-A084-B13F414915E6}" type="datetimeFigureOut">
               <a:rPr lang="en-US" smtClean="0"/>
-              <a:t>9/2/2023</a:t>
+              <a:t>9/21/2023</a:t>
             </a:fld>
             <a:endParaRPr lang="en-US"/>
           </a:p>
@@ -1157,7 +1157,7 @@
           <a:p>
             <a:fld id="{A881878F-9A12-42FD-A084-B13F414915E6}" type="datetimeFigureOut">
               <a:rPr lang="en-US" smtClean="0"/>
-              <a:t>9/2/2023</a:t>
+              <a:t>9/21/2023</a:t>
             </a:fld>
             <a:endParaRPr lang="en-US"/>
           </a:p>
@@ -1422,7 +1422,7 @@
           <a:p>
             <a:fld id="{A881878F-9A12-42FD-A084-B13F414915E6}" type="datetimeFigureOut">
               <a:rPr lang="en-US" smtClean="0"/>
-              <a:t>9/2/2023</a:t>
+              <a:t>9/21/2023</a:t>
             </a:fld>
             <a:endParaRPr lang="en-US"/>
           </a:p>
@@ -1834,7 +1834,7 @@
           <a:p>
             <a:fld id="{A881878F-9A12-42FD-A084-B13F414915E6}" type="datetimeFigureOut">
               <a:rPr lang="en-US" smtClean="0"/>
-              <a:t>9/2/2023</a:t>
+              <a:t>9/21/2023</a:t>
             </a:fld>
             <a:endParaRPr lang="en-US"/>
           </a:p>
@@ -1975,7 +1975,7 @@
           <a:p>
             <a:fld id="{A881878F-9A12-42FD-A084-B13F414915E6}" type="datetimeFigureOut">
               <a:rPr lang="en-US" smtClean="0"/>
-              <a:t>9/2/2023</a:t>
+              <a:t>9/21/2023</a:t>
             </a:fld>
             <a:endParaRPr lang="en-US"/>
           </a:p>
@@ -2088,7 +2088,7 @@
           <a:p>
             <a:fld id="{A881878F-9A12-42FD-A084-B13F414915E6}" type="datetimeFigureOut">
               <a:rPr lang="en-US" smtClean="0"/>
-              <a:t>9/2/2023</a:t>
+              <a:t>9/21/2023</a:t>
             </a:fld>
             <a:endParaRPr lang="en-US"/>
           </a:p>
@@ -2399,7 +2399,7 @@
           <a:p>
             <a:fld id="{A881878F-9A12-42FD-A084-B13F414915E6}" type="datetimeFigureOut">
               <a:rPr lang="en-US" smtClean="0"/>
-              <a:t>9/2/2023</a:t>
+              <a:t>9/21/2023</a:t>
             </a:fld>
             <a:endParaRPr lang="en-US"/>
           </a:p>
@@ -2687,7 +2687,7 @@
           <a:p>
             <a:fld id="{A881878F-9A12-42FD-A084-B13F414915E6}" type="datetimeFigureOut">
               <a:rPr lang="en-US" smtClean="0"/>
-              <a:t>9/2/2023</a:t>
+              <a:t>9/21/2023</a:t>
             </a:fld>
             <a:endParaRPr lang="en-US"/>
           </a:p>
@@ -2928,7 +2928,7 @@
           <a:p>
             <a:fld id="{A881878F-9A12-42FD-A084-B13F414915E6}" type="datetimeFigureOut">
               <a:rPr lang="en-US" smtClean="0"/>
-              <a:t>9/2/2023</a:t>
+              <a:t>9/21/2023</a:t>
             </a:fld>
             <a:endParaRPr lang="en-US"/>
           </a:p>
@@ -3360,9 +3360,9 @@
           <p:nvPr/>
         </p:nvCxnSpPr>
         <p:spPr>
-          <a:xfrm flipH="1">
-            <a:off x="4684938" y="1419833"/>
-            <a:ext cx="4980" cy="469712"/>
+          <a:xfrm>
+            <a:off x="4693714" y="1372692"/>
+            <a:ext cx="0" cy="603801"/>
           </a:xfrm>
           <a:prstGeom prst="line">
             <a:avLst/>
@@ -3400,13 +3400,14 @@
           </p:cNvPr>
           <p:cNvCxnSpPr>
             <a:cxnSpLocks/>
+            <a:endCxn id="18" idx="0"/>
           </p:cNvCxnSpPr>
           <p:nvPr/>
         </p:nvCxnSpPr>
         <p:spPr>
           <a:xfrm flipH="1">
-            <a:off x="6010654" y="1481761"/>
-            <a:ext cx="4980" cy="469712"/>
+            <a:off x="6058279" y="1363060"/>
+            <a:ext cx="7014" cy="697482"/>
           </a:xfrm>
           <a:prstGeom prst="line">
             <a:avLst/>
@@ -3853,8 +3854,8 @@
           </a:p>
         </p:txBody>
       </p:sp>
-      <mc:AlternateContent xmlns:mc="http://schemas.openxmlformats.org/markup-compatibility/2006">
-        <mc:Choice xmlns:a14="http://schemas.microsoft.com/office/drawing/2010/main" Requires="a14">
+      <mc:AlternateContent xmlns:mc="http://schemas.openxmlformats.org/markup-compatibility/2006" xmlns:a14="http://schemas.microsoft.com/office/drawing/2010/main">
+        <mc:Choice Requires="a14">
           <p:sp>
             <p:nvSpPr>
               <p:cNvPr id="21" name="TextBox 20">
@@ -3936,7 +3937,7 @@
             </p:txBody>
           </p:sp>
         </mc:Choice>
-        <mc:Fallback>
+        <mc:Fallback xmlns="">
           <p:sp>
             <p:nvSpPr>
               <p:cNvPr id="21" name="TextBox 20">
@@ -3981,8 +3982,8 @@
           </p:sp>
         </mc:Fallback>
       </mc:AlternateContent>
-      <mc:AlternateContent xmlns:mc="http://schemas.openxmlformats.org/markup-compatibility/2006">
-        <mc:Choice xmlns:a14="http://schemas.microsoft.com/office/drawing/2010/main" Requires="a14">
+      <mc:AlternateContent xmlns:mc="http://schemas.openxmlformats.org/markup-compatibility/2006" xmlns:a14="http://schemas.microsoft.com/office/drawing/2010/main">
+        <mc:Choice Requires="a14">
           <p:sp>
             <p:nvSpPr>
               <p:cNvPr id="22" name="TextBox 21">
@@ -4064,7 +4065,7 @@
             </p:txBody>
           </p:sp>
         </mc:Choice>
-        <mc:Fallback>
+        <mc:Fallback xmlns="">
           <p:sp>
             <p:nvSpPr>
               <p:cNvPr id="22" name="TextBox 21">
@@ -4203,7 +4204,7 @@
                       <m:r>
                         <a:rPr lang="en-US" sz="3600" b="0" i="1" smtClean="0">
                           <a:solidFill>
-                            <a:srgbClr val="FF00FF"/>
+                            <a:srgbClr val="0000FF"/>
                           </a:solidFill>
                           <a:latin typeface="Cambria Math" panose="02040503050406030204" pitchFamily="18" charset="0"/>
                         </a:rPr>
@@ -4214,7 +4215,7 @@
                           <m:ctrlPr>
                             <a:rPr lang="en-US" sz="3600" b="0" i="1" smtClean="0">
                               <a:solidFill>
-                                <a:srgbClr val="FF00FF"/>
+                                <a:srgbClr val="0000FF"/>
                               </a:solidFill>
                               <a:latin typeface="Cambria Math" panose="02040503050406030204" pitchFamily="18" charset="0"/>
                             </a:rPr>
@@ -4224,7 +4225,7 @@
                           <m:r>
                             <a:rPr lang="en-US" sz="3600" b="0" i="1" smtClean="0">
                               <a:solidFill>
-                                <a:srgbClr val="FF00FF"/>
+                                <a:srgbClr val="0000FF"/>
                               </a:solidFill>
                               <a:latin typeface="Cambria Math" panose="02040503050406030204" pitchFamily="18" charset="0"/>
                             </a:rPr>
@@ -4235,7 +4236,7 @@
                           <m:r>
                             <a:rPr lang="en-US" sz="3600" b="0" i="1" smtClean="0">
                               <a:solidFill>
-                                <a:srgbClr val="FF00FF"/>
+                                <a:srgbClr val="0000FF"/>
                               </a:solidFill>
                               <a:latin typeface="Cambria Math" panose="02040503050406030204" pitchFamily="18" charset="0"/>
                             </a:rPr>
@@ -4246,7 +4247,7 @@
                           <m:r>
                             <a:rPr lang="en-US" sz="3600" b="0" i="1" smtClean="0">
                               <a:solidFill>
-                                <a:srgbClr val="FF00FF"/>
+                                <a:srgbClr val="0000FF"/>
                               </a:solidFill>
                               <a:latin typeface="Cambria Math" panose="02040503050406030204" pitchFamily="18" charset="0"/>
                             </a:rPr>
@@ -4353,12 +4354,21 @@
                       <m:jc m:val="centerGroup"/>
                     </m:oMathParaPr>
                     <m:oMath xmlns:m="http://schemas.openxmlformats.org/officeDocument/2006/math">
+                      <m:r>
+                        <a:rPr lang="en-US" sz="3600" b="0" i="1" smtClean="0">
+                          <a:solidFill>
+                            <a:schemeClr val="tx1"/>
+                          </a:solidFill>
+                          <a:latin typeface="Cambria Math" panose="02040503050406030204" pitchFamily="18" charset="0"/>
+                        </a:rPr>
+                        <m:t>{</m:t>
+                      </m:r>
                       <m:sSubSup>
                         <m:sSubSupPr>
                           <m:ctrlPr>
                             <a:rPr lang="en-US" sz="3600" b="0" i="1" smtClean="0">
                               <a:solidFill>
-                                <a:srgbClr val="FF00FF"/>
+                                <a:schemeClr val="tx1"/>
                               </a:solidFill>
                               <a:latin typeface="Cambria Math" panose="02040503050406030204" pitchFamily="18" charset="0"/>
                             </a:rPr>
@@ -4372,66 +4382,57 @@
                               </a:solidFill>
                               <a:latin typeface="Cambria Math" panose="02040503050406030204" pitchFamily="18" charset="0"/>
                             </a:rPr>
-                            <m:t>{</m:t>
+                            <m:t>𝑥</m:t>
                           </m:r>
-                          <m:sSubSup>
-                            <m:sSubSupPr>
-                              <m:ctrlPr>
-                                <a:rPr lang="en-US" sz="3600" b="0" i="1" smtClean="0">
-                                  <a:solidFill>
-                                    <a:srgbClr val="0000FF"/>
-                                  </a:solidFill>
-                                  <a:latin typeface="Cambria Math" panose="02040503050406030204" pitchFamily="18" charset="0"/>
-                                </a:rPr>
-                              </m:ctrlPr>
-                            </m:sSubSupPr>
-                            <m:e>
-                              <m:r>
-                                <a:rPr lang="en-US" sz="3600" b="0" i="1" smtClean="0">
-                                  <a:solidFill>
-                                    <a:srgbClr val="0000FF"/>
-                                  </a:solidFill>
-                                  <a:latin typeface="Cambria Math" panose="02040503050406030204" pitchFamily="18" charset="0"/>
-                                </a:rPr>
-                                <m:t>𝑥</m:t>
-                              </m:r>
-                            </m:e>
-                            <m:sub>
-                              <m:r>
-                                <a:rPr lang="en-US" sz="3600" i="1">
-                                  <a:solidFill>
-                                    <a:srgbClr val="0000FF"/>
-                                  </a:solidFill>
-                                  <a:latin typeface="Cambria Math" panose="02040503050406030204" pitchFamily="18" charset="0"/>
-                                </a:rPr>
-                                <m:t>1</m:t>
-                              </m:r>
-                            </m:sub>
-                            <m:sup>
-                              <m:r>
-                                <a:rPr lang="en-US" sz="3600" b="0" i="1" smtClean="0">
-                                  <a:solidFill>
-                                    <a:srgbClr val="0000FF"/>
-                                  </a:solidFill>
-                                  <a:latin typeface="Cambria Math" panose="02040503050406030204" pitchFamily="18" charset="0"/>
-                                </a:rPr>
-                                <m:t>𝑡</m:t>
-                              </m:r>
-                            </m:sup>
-                          </m:sSubSup>
+                        </m:e>
+                        <m:sub>
                           <m:r>
                             <a:rPr lang="en-US" sz="3600" b="0" i="1" smtClean="0">
                               <a:solidFill>
-                                <a:srgbClr val="0000FF"/>
+                                <a:schemeClr val="tx1"/>
                               </a:solidFill>
                               <a:latin typeface="Cambria Math" panose="02040503050406030204" pitchFamily="18" charset="0"/>
                             </a:rPr>
-                            <m:t>,</m:t>
+                            <m:t>1</m:t>
                           </m:r>
+                        </m:sub>
+                        <m:sup>
                           <m:r>
                             <a:rPr lang="en-US" sz="3600" b="0" i="1" smtClean="0">
                               <a:solidFill>
-                                <a:srgbClr val="FF00FF"/>
+                                <a:schemeClr val="tx1"/>
+                              </a:solidFill>
+                              <a:latin typeface="Cambria Math" panose="02040503050406030204" pitchFamily="18" charset="0"/>
+                            </a:rPr>
+                            <m:t>𝑡</m:t>
+                          </m:r>
+                        </m:sup>
+                      </m:sSubSup>
+                      <m:r>
+                        <a:rPr lang="en-US" sz="3600" b="0" i="1" smtClean="0">
+                          <a:solidFill>
+                            <a:schemeClr val="tx1"/>
+                          </a:solidFill>
+                          <a:latin typeface="Cambria Math" panose="02040503050406030204" pitchFamily="18" charset="0"/>
+                        </a:rPr>
+                        <m:t>,</m:t>
+                      </m:r>
+                      <m:sSubSup>
+                        <m:sSubSupPr>
+                          <m:ctrlPr>
+                            <a:rPr lang="en-US" sz="3600" b="0" i="1" smtClean="0">
+                              <a:solidFill>
+                                <a:schemeClr val="tx1"/>
+                              </a:solidFill>
+                              <a:latin typeface="Cambria Math" panose="02040503050406030204" pitchFamily="18" charset="0"/>
+                            </a:rPr>
+                          </m:ctrlPr>
+                        </m:sSubSupPr>
+                        <m:e>
+                          <m:r>
+                            <a:rPr lang="en-US" sz="3600" b="0" i="1" smtClean="0">
+                              <a:solidFill>
+                                <a:schemeClr val="tx1"/>
                               </a:solidFill>
                               <a:latin typeface="Cambria Math" panose="02040503050406030204" pitchFamily="18" charset="0"/>
                             </a:rPr>
@@ -4442,7 +4443,7 @@
                           <m:r>
                             <a:rPr lang="en-US" sz="3600" b="0" i="1" smtClean="0">
                               <a:solidFill>
-                                <a:srgbClr val="FF00FF"/>
+                                <a:schemeClr val="tx1"/>
                               </a:solidFill>
                               <a:latin typeface="Cambria Math" panose="02040503050406030204" pitchFamily="18" charset="0"/>
                             </a:rPr>
@@ -4453,7 +4454,7 @@
                           <m:r>
                             <a:rPr lang="en-US" sz="3600" b="0" i="1" smtClean="0">
                               <a:solidFill>
-                                <a:srgbClr val="FF00FF"/>
+                                <a:schemeClr val="tx1"/>
                               </a:solidFill>
                               <a:latin typeface="Cambria Math" panose="02040503050406030204" pitchFamily="18" charset="0"/>
                             </a:rPr>
@@ -4614,8 +4615,8 @@
           </a:fontRef>
         </p:style>
       </p:cxnSp>
-      <mc:AlternateContent xmlns:mc="http://schemas.openxmlformats.org/markup-compatibility/2006">
-        <mc:Choice xmlns:a14="http://schemas.microsoft.com/office/drawing/2010/main" Requires="a14">
+      <mc:AlternateContent xmlns:mc="http://schemas.openxmlformats.org/markup-compatibility/2006" xmlns:a14="http://schemas.microsoft.com/office/drawing/2010/main">
+        <mc:Choice Requires="a14">
           <p:sp>
             <p:nvSpPr>
               <p:cNvPr id="43" name="TextBox 42">
@@ -4680,7 +4681,7 @@
             </p:txBody>
           </p:sp>
         </mc:Choice>
-        <mc:Fallback>
+        <mc:Fallback xmlns="">
           <p:sp>
             <p:nvSpPr>
               <p:cNvPr id="43" name="TextBox 42">
@@ -4740,9 +4741,9 @@
           <p:nvPr/>
         </p:nvCxnSpPr>
         <p:spPr>
-          <a:xfrm>
-            <a:off x="4684242" y="2673863"/>
-            <a:ext cx="0" cy="2267030"/>
+          <a:xfrm flipH="1">
+            <a:off x="4684210" y="2673863"/>
+            <a:ext cx="32" cy="2364849"/>
           </a:xfrm>
           <a:prstGeom prst="line">
             <a:avLst/>
@@ -4784,9 +4785,9 @@
           <p:nvPr/>
         </p:nvCxnSpPr>
         <p:spPr>
-          <a:xfrm flipH="1">
-            <a:off x="6972701" y="4502663"/>
-            <a:ext cx="1" cy="438230"/>
+          <a:xfrm>
+            <a:off x="6972702" y="4502663"/>
+            <a:ext cx="7246" cy="1405660"/>
           </a:xfrm>
           <a:prstGeom prst="line">
             <a:avLst/>
@@ -4829,8 +4830,8 @@
         </p:nvCxnSpPr>
         <p:spPr>
           <a:xfrm>
-            <a:off x="7384158" y="2289142"/>
-            <a:ext cx="4289621" cy="0"/>
+            <a:off x="7284707" y="2289142"/>
+            <a:ext cx="4389072" cy="0"/>
           </a:xfrm>
           <a:prstGeom prst="line">
             <a:avLst/>
@@ -4901,8 +4902,8 @@
           </a:fontRef>
         </p:style>
       </p:cxnSp>
-      <mc:AlternateContent xmlns:mc="http://schemas.openxmlformats.org/markup-compatibility/2006">
-        <mc:Choice xmlns:a14="http://schemas.microsoft.com/office/drawing/2010/main" Requires="a14">
+      <mc:AlternateContent xmlns:mc="http://schemas.openxmlformats.org/markup-compatibility/2006" xmlns:a14="http://schemas.microsoft.com/office/drawing/2010/main">
+        <mc:Choice Requires="a14">
           <p:sp>
             <p:nvSpPr>
               <p:cNvPr id="45" name="TextBox 44">
@@ -4968,7 +4969,7 @@
             </p:txBody>
           </p:sp>
         </mc:Choice>
-        <mc:Fallback>
+        <mc:Fallback xmlns="">
           <p:sp>
             <p:nvSpPr>
               <p:cNvPr id="45" name="TextBox 44">
@@ -5030,7 +5031,7 @@
             <p:spPr>
               <a:xfrm>
                 <a:off x="4981206" y="5197847"/>
-                <a:ext cx="1007648" cy="633571"/>
+                <a:ext cx="1007647" cy="633571"/>
               </a:xfrm>
               <a:prstGeom prst="rect">
                 <a:avLst/>
@@ -5062,8 +5063,8 @@
                         </a:rPr>
                         <m:t>Δ</m:t>
                       </m:r>
-                      <m:sSubSup>
-                        <m:sSubSupPr>
+                      <m:sSup>
+                        <m:sSupPr>
                           <m:ctrlPr>
                             <a:rPr lang="en-US" sz="3600" b="0" i="1" dirty="0" smtClean="0">
                               <a:solidFill>
@@ -5072,7 +5073,7 @@
                               <a:latin typeface="Cambria Math" panose="02040503050406030204" pitchFamily="18" charset="0"/>
                             </a:rPr>
                           </m:ctrlPr>
-                        </m:sSubSupPr>
+                        </m:sSupPr>
                         <m:e>
                           <m:r>
                             <a:rPr lang="en-US" sz="3600" b="0" i="1" dirty="0" smtClean="0">
@@ -5084,17 +5085,6 @@
                             <m:t>𝑥</m:t>
                           </m:r>
                         </m:e>
-                        <m:sub>
-                          <m:r>
-                            <a:rPr lang="en-US" sz="3600" b="0" i="1" dirty="0" smtClean="0">
-                              <a:solidFill>
-                                <a:srgbClr val="FF00FF"/>
-                              </a:solidFill>
-                              <a:latin typeface="Cambria Math" panose="02040503050406030204" pitchFamily="18" charset="0"/>
-                            </a:rPr>
-                            <m:t>1</m:t>
-                          </m:r>
-                        </m:sub>
                         <m:sup>
                           <m:r>
                             <a:rPr lang="en-US" sz="3600" b="0" i="1" dirty="0" smtClean="0">
@@ -5106,7 +5096,7 @@
                             <m:t>𝑟</m:t>
                           </m:r>
                         </m:sup>
-                      </m:sSubSup>
+                      </m:sSup>
                     </m:oMath>
                   </m:oMathPara>
                 </a14:m>
@@ -5133,7 +5123,7 @@
             <p:spPr>
               <a:xfrm>
                 <a:off x="4981206" y="5197847"/>
-                <a:ext cx="1007648" cy="633571"/>
+                <a:ext cx="1007647" cy="633571"/>
               </a:xfrm>
               <a:prstGeom prst="rect">
                 <a:avLst/>
@@ -5222,7 +5212,7 @@
             <p:spPr>
               <a:xfrm>
                 <a:off x="4981206" y="678677"/>
-                <a:ext cx="1007648" cy="637419"/>
+                <a:ext cx="1007647" cy="637419"/>
               </a:xfrm>
               <a:prstGeom prst="rect">
                 <a:avLst/>
@@ -5325,7 +5315,7 @@
             <p:spPr>
               <a:xfrm>
                 <a:off x="4981206" y="678677"/>
-                <a:ext cx="1007648" cy="637419"/>
+                <a:ext cx="1007647" cy="637419"/>
               </a:xfrm>
               <a:prstGeom prst="rect">
                 <a:avLst/>
@@ -5368,8 +5358,8 @@
         </p:nvCxnSpPr>
         <p:spPr>
           <a:xfrm flipH="1" flipV="1">
-            <a:off x="4684242" y="1382732"/>
-            <a:ext cx="1326412" cy="26034"/>
+            <a:off x="4693714" y="1353428"/>
+            <a:ext cx="1364565" cy="21314"/>
           </a:xfrm>
           <a:prstGeom prst="straightConnector1">
             <a:avLst/>
@@ -5441,52 +5431,8 @@
           </a:fontRef>
         </p:style>
       </p:cxnSp>
-      <p:cxnSp>
-        <p:nvCxnSpPr>
-          <p:cNvPr id="62" name="Straight Connector 61">
-            <a:extLst>
-              <a:ext uri="{FF2B5EF4-FFF2-40B4-BE49-F238E27FC236}">
-                <a16:creationId xmlns:a16="http://schemas.microsoft.com/office/drawing/2014/main" id="{48603329-959D-4655-8D10-591B3B98FCF7}"/>
-              </a:ext>
-            </a:extLst>
-          </p:cNvPr>
-          <p:cNvCxnSpPr>
-            <a:cxnSpLocks/>
-          </p:cNvCxnSpPr>
-          <p:nvPr/>
-        </p:nvCxnSpPr>
-        <p:spPr>
-          <a:xfrm>
-            <a:off x="6979948" y="5183368"/>
-            <a:ext cx="0" cy="607253"/>
-          </a:xfrm>
-          <a:prstGeom prst="line">
-            <a:avLst/>
-          </a:prstGeom>
-          <a:ln w="31750">
-            <a:solidFill>
-              <a:schemeClr val="tx1"/>
-            </a:solidFill>
-            <a:prstDash val="sysDot"/>
-          </a:ln>
-        </p:spPr>
-        <p:style>
-          <a:lnRef idx="1">
-            <a:schemeClr val="accent1"/>
-          </a:lnRef>
-          <a:fillRef idx="0">
-            <a:schemeClr val="accent1"/>
-          </a:fillRef>
-          <a:effectRef idx="0">
-            <a:schemeClr val="accent1"/>
-          </a:effectRef>
-          <a:fontRef idx="minor">
-            <a:schemeClr val="tx1"/>
-          </a:fontRef>
-        </p:style>
-      </p:cxnSp>
-      <mc:AlternateContent xmlns:mc="http://schemas.openxmlformats.org/markup-compatibility/2006">
-        <mc:Choice xmlns:a14="http://schemas.microsoft.com/office/drawing/2010/main" Requires="a14">
+      <mc:AlternateContent xmlns:mc="http://schemas.openxmlformats.org/markup-compatibility/2006" xmlns:a14="http://schemas.microsoft.com/office/drawing/2010/main">
+        <mc:Choice Requires="a14">
           <p:sp>
             <p:nvSpPr>
               <p:cNvPr id="38" name="TextBox 37">
@@ -5555,7 +5501,7 @@
             </p:txBody>
           </p:sp>
         </mc:Choice>
-        <mc:Fallback>
+        <mc:Fallback xmlns="">
           <p:sp>
             <p:nvSpPr>
               <p:cNvPr id="38" name="TextBox 37">
@@ -5617,7 +5563,7 @@
             <p:spPr>
               <a:xfrm>
                 <a:off x="7145068" y="3410055"/>
-                <a:ext cx="740972" cy="646331"/>
+                <a:ext cx="801823" cy="646331"/>
               </a:xfrm>
               <a:prstGeom prst="rect">
                 <a:avLst/>
@@ -5637,31 +5583,18 @@
                       <m:jc m:val="centerGroup"/>
                     </m:oMathParaPr>
                     <m:oMath xmlns:m="http://schemas.openxmlformats.org/officeDocument/2006/math">
-                      <m:sSub>
-                        <m:sSubPr>
-                          <m:ctrlPr>
-                            <a:rPr lang="en-US" sz="3600" b="0" i="1" smtClean="0">
-                              <a:latin typeface="Cambria Math" panose="02040503050406030204" pitchFamily="18" charset="0"/>
-                            </a:rPr>
-                          </m:ctrlPr>
-                        </m:sSubPr>
-                        <m:e>
-                          <m:r>
-                            <a:rPr lang="en-US" sz="3600" b="0" i="1" smtClean="0">
-                              <a:latin typeface="Cambria Math" panose="02040503050406030204" pitchFamily="18" charset="0"/>
-                            </a:rPr>
-                            <m:t>𝑝</m:t>
-                          </m:r>
-                        </m:e>
-                        <m:sub>
-                          <m:r>
-                            <a:rPr lang="en-US" sz="3600" b="0" i="1" smtClean="0">
-                              <a:latin typeface="Cambria Math" panose="02040503050406030204" pitchFamily="18" charset="0"/>
-                            </a:rPr>
-                            <m:t>1</m:t>
-                          </m:r>
-                        </m:sub>
-                      </m:sSub>
+                      <m:r>
+                        <a:rPr lang="en-US" sz="3600" b="0" i="1" smtClean="0">
+                          <a:latin typeface="Cambria Math" panose="02040503050406030204" pitchFamily="18" charset="0"/>
+                        </a:rPr>
+                        <m:t>𝑝</m:t>
+                      </m:r>
+                      <m:r>
+                        <a:rPr lang="en-US" sz="3600" b="0" i="1" smtClean="0">
+                          <a:latin typeface="Cambria Math" panose="02040503050406030204" pitchFamily="18" charset="0"/>
+                        </a:rPr>
+                        <m:t>1</m:t>
+                      </m:r>
                     </m:oMath>
                   </m:oMathPara>
                 </a14:m>
@@ -5688,7 +5621,7 @@
             <p:spPr>
               <a:xfrm>
                 <a:off x="7145068" y="3410055"/>
-                <a:ext cx="740972" cy="646331"/>
+                <a:ext cx="801823" cy="646331"/>
               </a:xfrm>
               <a:prstGeom prst="rect">
                 <a:avLst/>
@@ -5760,8 +5693,8 @@
           </a:fontRef>
         </p:style>
       </p:cxnSp>
-      <mc:AlternateContent xmlns:mc="http://schemas.openxmlformats.org/markup-compatibility/2006">
-        <mc:Choice xmlns:a14="http://schemas.microsoft.com/office/drawing/2010/main" Requires="a14">
+      <mc:AlternateContent xmlns:mc="http://schemas.openxmlformats.org/markup-compatibility/2006" xmlns:a14="http://schemas.microsoft.com/office/drawing/2010/main">
+        <mc:Choice Requires="a14">
           <p:sp>
             <p:nvSpPr>
               <p:cNvPr id="44" name="TextBox 43">
@@ -5826,7 +5759,7 @@
             </p:txBody>
           </p:sp>
         </mc:Choice>
-        <mc:Fallback>
+        <mc:Fallback xmlns="">
           <p:sp>
             <p:nvSpPr>
               <p:cNvPr id="44" name="TextBox 43">
@@ -5886,9 +5819,9 @@
           <p:nvPr/>
         </p:nvCxnSpPr>
         <p:spPr>
-          <a:xfrm>
-            <a:off x="10759389" y="2258736"/>
-            <a:ext cx="0" cy="1828800"/>
+          <a:xfrm flipH="1">
+            <a:off x="10759389" y="2289141"/>
+            <a:ext cx="14666" cy="1798395"/>
           </a:xfrm>
           <a:prstGeom prst="straightConnector1">
             <a:avLst/>
@@ -6052,6 +5985,50 @@
           </p:sp>
         </mc:Fallback>
       </mc:AlternateContent>
+      <p:cxnSp>
+        <p:nvCxnSpPr>
+          <p:cNvPr id="2" name="Straight Connector 1">
+            <a:extLst>
+              <a:ext uri="{FF2B5EF4-FFF2-40B4-BE49-F238E27FC236}">
+                <a16:creationId xmlns:a16="http://schemas.microsoft.com/office/drawing/2014/main" id="{791EAF15-CFE0-2A00-FA67-DE04D62F4C7E}"/>
+              </a:ext>
+            </a:extLst>
+          </p:cNvPr>
+          <p:cNvCxnSpPr>
+            <a:cxnSpLocks/>
+          </p:cNvCxnSpPr>
+          <p:nvPr/>
+        </p:nvCxnSpPr>
+        <p:spPr>
+          <a:xfrm flipV="1">
+            <a:off x="1249733" y="2289142"/>
+            <a:ext cx="2194536" cy="2675"/>
+          </a:xfrm>
+          <a:prstGeom prst="line">
+            <a:avLst/>
+          </a:prstGeom>
+          <a:ln w="31750">
+            <a:solidFill>
+              <a:schemeClr val="tx1"/>
+            </a:solidFill>
+            <a:prstDash val="sysDot"/>
+          </a:ln>
+        </p:spPr>
+        <p:style>
+          <a:lnRef idx="1">
+            <a:schemeClr val="accent1"/>
+          </a:lnRef>
+          <a:fillRef idx="0">
+            <a:schemeClr val="accent1"/>
+          </a:fillRef>
+          <a:effectRef idx="0">
+            <a:schemeClr val="accent1"/>
+          </a:effectRef>
+          <a:fontRef idx="minor">
+            <a:schemeClr val="tx1"/>
+          </a:fontRef>
+        </p:style>
+      </p:cxnSp>
     </p:spTree>
     <p:extLst>
       <p:ext uri="{BB962C8B-B14F-4D97-AF65-F5344CB8AC3E}">

</xml_diff>

<commit_message>
Integration of the Pantheon data set.
</commit_message>
<xml_diff>
--- a/Spacetime Interval.pptx
+++ b/Spacetime Interval.pptx
@@ -123,14 +123,6 @@
 </p:presentation>
 </file>
 
-<file path=ppt/revisionInfo.xml><?xml version="1.0" encoding="utf-8"?>
-<p1510:revInfo xmlns:a="http://schemas.openxmlformats.org/drawingml/2006/main" xmlns:r="http://schemas.openxmlformats.org/officeDocument/2006/relationships" xmlns:p1510="http://schemas.microsoft.com/office/powerpoint/2015/10/main">
-  <p1510:revLst>
-    <p1510:client id="{1C0D0845-51BA-46AE-82A0-BD772AF489BD}" v="13" dt="2022-07-03T23:51:53.659"/>
-  </p1510:revLst>
-</p1510:revInfo>
-</file>
-
 <file path=ppt/slideLayouts/slideLayout1.xml><?xml version="1.0" encoding="utf-8"?>
 <p:sldLayout xmlns:a="http://schemas.openxmlformats.org/drawingml/2006/main" xmlns:r="http://schemas.openxmlformats.org/officeDocument/2006/relationships" xmlns:p="http://schemas.openxmlformats.org/presentationml/2006/main" type="title" preserve="1">
   <p:cSld name="Title Slide">
@@ -278,7 +270,7 @@
           <a:p>
             <a:fld id="{A881878F-9A12-42FD-A084-B13F414915E6}" type="datetimeFigureOut">
               <a:rPr lang="en-US" smtClean="0"/>
-              <a:t>9/21/2023</a:t>
+              <a:t>10/7/2023</a:t>
             </a:fld>
             <a:endParaRPr lang="en-US"/>
           </a:p>
@@ -476,7 +468,7 @@
           <a:p>
             <a:fld id="{A881878F-9A12-42FD-A084-B13F414915E6}" type="datetimeFigureOut">
               <a:rPr lang="en-US" smtClean="0"/>
-              <a:t>9/21/2023</a:t>
+              <a:t>10/7/2023</a:t>
             </a:fld>
             <a:endParaRPr lang="en-US"/>
           </a:p>
@@ -684,7 +676,7 @@
           <a:p>
             <a:fld id="{A881878F-9A12-42FD-A084-B13F414915E6}" type="datetimeFigureOut">
               <a:rPr lang="en-US" smtClean="0"/>
-              <a:t>9/21/2023</a:t>
+              <a:t>10/7/2023</a:t>
             </a:fld>
             <a:endParaRPr lang="en-US"/>
           </a:p>
@@ -882,7 +874,7 @@
           <a:p>
             <a:fld id="{A881878F-9A12-42FD-A084-B13F414915E6}" type="datetimeFigureOut">
               <a:rPr lang="en-US" smtClean="0"/>
-              <a:t>9/21/2023</a:t>
+              <a:t>10/7/2023</a:t>
             </a:fld>
             <a:endParaRPr lang="en-US"/>
           </a:p>
@@ -1157,7 +1149,7 @@
           <a:p>
             <a:fld id="{A881878F-9A12-42FD-A084-B13F414915E6}" type="datetimeFigureOut">
               <a:rPr lang="en-US" smtClean="0"/>
-              <a:t>9/21/2023</a:t>
+              <a:t>10/7/2023</a:t>
             </a:fld>
             <a:endParaRPr lang="en-US"/>
           </a:p>
@@ -1422,7 +1414,7 @@
           <a:p>
             <a:fld id="{A881878F-9A12-42FD-A084-B13F414915E6}" type="datetimeFigureOut">
               <a:rPr lang="en-US" smtClean="0"/>
-              <a:t>9/21/2023</a:t>
+              <a:t>10/7/2023</a:t>
             </a:fld>
             <a:endParaRPr lang="en-US"/>
           </a:p>
@@ -1834,7 +1826,7 @@
           <a:p>
             <a:fld id="{A881878F-9A12-42FD-A084-B13F414915E6}" type="datetimeFigureOut">
               <a:rPr lang="en-US" smtClean="0"/>
-              <a:t>9/21/2023</a:t>
+              <a:t>10/7/2023</a:t>
             </a:fld>
             <a:endParaRPr lang="en-US"/>
           </a:p>
@@ -1975,7 +1967,7 @@
           <a:p>
             <a:fld id="{A881878F-9A12-42FD-A084-B13F414915E6}" type="datetimeFigureOut">
               <a:rPr lang="en-US" smtClean="0"/>
-              <a:t>9/21/2023</a:t>
+              <a:t>10/7/2023</a:t>
             </a:fld>
             <a:endParaRPr lang="en-US"/>
           </a:p>
@@ -2088,7 +2080,7 @@
           <a:p>
             <a:fld id="{A881878F-9A12-42FD-A084-B13F414915E6}" type="datetimeFigureOut">
               <a:rPr lang="en-US" smtClean="0"/>
-              <a:t>9/21/2023</a:t>
+              <a:t>10/7/2023</a:t>
             </a:fld>
             <a:endParaRPr lang="en-US"/>
           </a:p>
@@ -2399,7 +2391,7 @@
           <a:p>
             <a:fld id="{A881878F-9A12-42FD-A084-B13F414915E6}" type="datetimeFigureOut">
               <a:rPr lang="en-US" smtClean="0"/>
-              <a:t>9/21/2023</a:t>
+              <a:t>10/7/2023</a:t>
             </a:fld>
             <a:endParaRPr lang="en-US"/>
           </a:p>
@@ -2687,7 +2679,7 @@
           <a:p>
             <a:fld id="{A881878F-9A12-42FD-A084-B13F414915E6}" type="datetimeFigureOut">
               <a:rPr lang="en-US" smtClean="0"/>
-              <a:t>9/21/2023</a:t>
+              <a:t>10/7/2023</a:t>
             </a:fld>
             <a:endParaRPr lang="en-US"/>
           </a:p>
@@ -2928,7 +2920,7 @@
           <a:p>
             <a:fld id="{A881878F-9A12-42FD-A084-B13F414915E6}" type="datetimeFigureOut">
               <a:rPr lang="en-US" smtClean="0"/>
-              <a:t>9/21/2023</a:t>
+              <a:t>10/7/2023</a:t>
             </a:fld>
             <a:endParaRPr lang="en-US"/>
           </a:p>
@@ -3356,13 +3348,14 @@
           </p:cNvPr>
           <p:cNvCxnSpPr>
             <a:cxnSpLocks/>
+            <a:endCxn id="17" idx="0"/>
           </p:cNvCxnSpPr>
           <p:nvPr/>
         </p:nvCxnSpPr>
         <p:spPr>
-          <a:xfrm>
-            <a:off x="4693714" y="1372692"/>
-            <a:ext cx="0" cy="603801"/>
+          <a:xfrm flipH="1">
+            <a:off x="5167170" y="1372692"/>
+            <a:ext cx="7014" cy="687850"/>
           </a:xfrm>
           <a:prstGeom prst="line">
             <a:avLst/>
@@ -3406,7 +3399,7 @@
         </p:nvCxnSpPr>
         <p:spPr>
           <a:xfrm flipH="1">
-            <a:off x="6058279" y="1363060"/>
+            <a:off x="6538749" y="1363060"/>
             <a:ext cx="7014" cy="697482"/>
           </a:xfrm>
           <a:prstGeom prst="line">
@@ -3443,12 +3436,14 @@
               </a:ext>
             </a:extLst>
           </p:cNvPr>
-          <p:cNvCxnSpPr/>
+          <p:cNvCxnSpPr>
+            <a:cxnSpLocks/>
+          </p:cNvCxnSpPr>
           <p:nvPr/>
         </p:nvCxnSpPr>
         <p:spPr>
           <a:xfrm>
-            <a:off x="3543720" y="2289162"/>
+            <a:off x="4024190" y="2289162"/>
             <a:ext cx="3657560" cy="0"/>
           </a:xfrm>
           <a:prstGeom prst="line">
@@ -3491,7 +3486,7 @@
         </p:nvCxnSpPr>
         <p:spPr>
           <a:xfrm>
-            <a:off x="1257700" y="4117942"/>
+            <a:off x="1738170" y="4117942"/>
             <a:ext cx="8229600" cy="0"/>
           </a:xfrm>
           <a:prstGeom prst="line">
@@ -3527,12 +3522,14 @@
               </a:ext>
             </a:extLst>
           </p:cNvPr>
-          <p:cNvCxnSpPr/>
+          <p:cNvCxnSpPr>
+            <a:cxnSpLocks/>
+          </p:cNvCxnSpPr>
           <p:nvPr/>
         </p:nvCxnSpPr>
         <p:spPr>
           <a:xfrm>
-            <a:off x="3543720" y="1831942"/>
+            <a:off x="4024190" y="1831942"/>
             <a:ext cx="0" cy="914400"/>
           </a:xfrm>
           <a:prstGeom prst="line">
@@ -3564,12 +3561,14 @@
               </a:ext>
             </a:extLst>
           </p:cNvPr>
-          <p:cNvCxnSpPr/>
+          <p:cNvCxnSpPr>
+            <a:cxnSpLocks/>
+          </p:cNvCxnSpPr>
           <p:nvPr/>
         </p:nvCxnSpPr>
         <p:spPr>
           <a:xfrm>
-            <a:off x="7201300" y="1831942"/>
+            <a:off x="7681770" y="1831942"/>
             <a:ext cx="0" cy="914400"/>
           </a:xfrm>
           <a:prstGeom prst="line">
@@ -3601,12 +3600,14 @@
               </a:ext>
             </a:extLst>
           </p:cNvPr>
-          <p:cNvCxnSpPr/>
+          <p:cNvCxnSpPr>
+            <a:cxnSpLocks/>
+          </p:cNvCxnSpPr>
           <p:nvPr/>
         </p:nvCxnSpPr>
         <p:spPr>
           <a:xfrm>
-            <a:off x="1257700" y="3613418"/>
+            <a:off x="1738170" y="3613418"/>
             <a:ext cx="0" cy="914400"/>
           </a:xfrm>
           <a:prstGeom prst="line">
@@ -3638,12 +3639,14 @@
               </a:ext>
             </a:extLst>
           </p:cNvPr>
-          <p:cNvCxnSpPr/>
+          <p:cNvCxnSpPr>
+            <a:cxnSpLocks/>
+          </p:cNvCxnSpPr>
           <p:nvPr/>
         </p:nvCxnSpPr>
         <p:spPr>
           <a:xfrm>
-            <a:off x="9487300" y="3613418"/>
+            <a:off x="9967770" y="3613418"/>
             <a:ext cx="0" cy="914400"/>
           </a:xfrm>
           <a:prstGeom prst="line">
@@ -3680,7 +3683,7 @@
         </p:nvSpPr>
         <p:spPr>
           <a:xfrm>
-            <a:off x="4458100" y="2060542"/>
+            <a:off x="4938570" y="2060542"/>
             <a:ext cx="457200" cy="457200"/>
           </a:xfrm>
           <a:prstGeom prst="ellipse">
@@ -3727,7 +3730,7 @@
         </p:nvSpPr>
         <p:spPr>
           <a:xfrm>
-            <a:off x="5829679" y="2060542"/>
+            <a:off x="6310149" y="2060542"/>
             <a:ext cx="457200" cy="457200"/>
           </a:xfrm>
           <a:prstGeom prst="ellipse">
@@ -3774,7 +3777,7 @@
         </p:nvSpPr>
         <p:spPr>
           <a:xfrm>
-            <a:off x="3543700" y="3889342"/>
+            <a:off x="4016173" y="3889342"/>
             <a:ext cx="457200" cy="457200"/>
           </a:xfrm>
           <a:prstGeom prst="ellipse">
@@ -3821,7 +3824,7 @@
         </p:nvSpPr>
         <p:spPr>
           <a:xfrm>
-            <a:off x="6744101" y="3889342"/>
+            <a:off x="7224571" y="3889342"/>
             <a:ext cx="457200" cy="457200"/>
           </a:xfrm>
           <a:prstGeom prst="ellipse">
@@ -3854,8 +3857,8 @@
           </a:p>
         </p:txBody>
       </p:sp>
-      <mc:AlternateContent xmlns:mc="http://schemas.openxmlformats.org/markup-compatibility/2006" xmlns:a14="http://schemas.microsoft.com/office/drawing/2010/main">
-        <mc:Choice Requires="a14">
+      <mc:AlternateContent xmlns:mc="http://schemas.openxmlformats.org/markup-compatibility/2006">
+        <mc:Choice xmlns:a14="http://schemas.microsoft.com/office/drawing/2010/main" Requires="a14">
           <p:sp>
             <p:nvSpPr>
               <p:cNvPr id="21" name="TextBox 20">
@@ -3870,8 +3873,8 @@
             </p:nvSpPr>
             <p:spPr>
               <a:xfrm>
-                <a:off x="426782" y="1965976"/>
-                <a:ext cx="715196" cy="646331"/>
+                <a:off x="907252" y="1965976"/>
+                <a:ext cx="715196" cy="653449"/>
               </a:xfrm>
               <a:prstGeom prst="rect">
                 <a:avLst/>
@@ -3879,7 +3882,7 @@
               <a:noFill/>
             </p:spPr>
             <p:txBody>
-              <a:bodyPr wrap="none" rtlCol="0">
+              <a:bodyPr wrap="square" rtlCol="0">
                 <a:spAutoFit/>
               </a:bodyPr>
               <a:lstStyle/>
@@ -3891,17 +3894,17 @@
                       <m:jc m:val="centerGroup"/>
                     </m:oMathParaPr>
                     <m:oMath xmlns:m="http://schemas.openxmlformats.org/officeDocument/2006/math">
-                      <m:sSub>
-                        <m:sSubPr>
+                      <m:sSubSup>
+                        <m:sSubSupPr>
                           <m:ctrlPr>
-                            <a:rPr lang="en-US" sz="3600" i="1">
+                            <a:rPr lang="en-US" sz="3600" i="1" smtClean="0">
                               <a:solidFill>
                                 <a:srgbClr val="0000FF"/>
                               </a:solidFill>
                               <a:latin typeface="Cambria Math" panose="02040503050406030204" pitchFamily="18" charset="0"/>
                             </a:rPr>
                           </m:ctrlPr>
-                        </m:sSubPr>
+                        </m:sSubSupPr>
                         <m:e>
                           <m:r>
                             <a:rPr lang="en-US" sz="3600" i="1">
@@ -3910,7 +3913,7 @@
                               </a:solidFill>
                               <a:latin typeface="Cambria Math" panose="02040503050406030204" pitchFamily="18" charset="0"/>
                             </a:rPr>
-                            <m:t>𝜏</m:t>
+                            <m:t>𝑥</m:t>
                           </m:r>
                         </m:e>
                         <m:sub>
@@ -3924,7 +3927,18 @@
                             <m:t>0</m:t>
                           </m:r>
                         </m:sub>
-                      </m:sSub>
+                        <m:sup>
+                          <m:r>
+                            <a:rPr lang="en-US" sz="3600" i="1">
+                              <a:solidFill>
+                                <a:srgbClr val="0000FF"/>
+                              </a:solidFill>
+                              <a:latin typeface="Cambria Math" panose="02040503050406030204" pitchFamily="18" charset="0"/>
+                            </a:rPr>
+                            <m:t>𝑡</m:t>
+                          </m:r>
+                        </m:sup>
+                      </m:sSubSup>
                     </m:oMath>
                   </m:oMathPara>
                 </a14:m>
@@ -3937,7 +3951,7 @@
             </p:txBody>
           </p:sp>
         </mc:Choice>
-        <mc:Fallback xmlns="">
+        <mc:Fallback>
           <p:sp>
             <p:nvSpPr>
               <p:cNvPr id="21" name="TextBox 20">
@@ -3954,8 +3968,8 @@
             </p:nvSpPr>
             <p:spPr>
               <a:xfrm>
-                <a:off x="426782" y="1965976"/>
-                <a:ext cx="715196" cy="646331"/>
+                <a:off x="907252" y="1965976"/>
+                <a:ext cx="715196" cy="653449"/>
               </a:xfrm>
               <a:prstGeom prst="rect">
                 <a:avLst/>
@@ -3982,8 +3996,8 @@
           </p:sp>
         </mc:Fallback>
       </mc:AlternateContent>
-      <mc:AlternateContent xmlns:mc="http://schemas.openxmlformats.org/markup-compatibility/2006" xmlns:a14="http://schemas.microsoft.com/office/drawing/2010/main">
-        <mc:Choice Requires="a14">
+      <mc:AlternateContent xmlns:mc="http://schemas.openxmlformats.org/markup-compatibility/2006">
+        <mc:Choice xmlns:a14="http://schemas.microsoft.com/office/drawing/2010/main" Requires="a14">
           <p:sp>
             <p:nvSpPr>
               <p:cNvPr id="22" name="TextBox 21">
@@ -3998,7 +4012,7 @@
             </p:nvSpPr>
             <p:spPr>
               <a:xfrm>
-                <a:off x="416947" y="3747452"/>
+                <a:off x="897417" y="3747452"/>
                 <a:ext cx="715196" cy="646331"/>
               </a:xfrm>
               <a:prstGeom prst="rect">
@@ -4007,7 +4021,7 @@
               <a:noFill/>
             </p:spPr>
             <p:txBody>
-              <a:bodyPr wrap="none" rtlCol="0">
+              <a:bodyPr wrap="square" rtlCol="0">
                 <a:spAutoFit/>
               </a:bodyPr>
               <a:lstStyle/>
@@ -4019,8 +4033,8 @@
                       <m:jc m:val="centerGroup"/>
                     </m:oMathParaPr>
                     <m:oMath xmlns:m="http://schemas.openxmlformats.org/officeDocument/2006/math">
-                      <m:sSub>
-                        <m:sSubPr>
+                      <m:sSubSup>
+                        <m:sSubSupPr>
                           <m:ctrlPr>
                             <a:rPr lang="en-US" sz="3600" i="1" smtClean="0">
                               <a:solidFill>
@@ -4029,7 +4043,7 @@
                               <a:latin typeface="Cambria Math" panose="02040503050406030204" pitchFamily="18" charset="0"/>
                             </a:rPr>
                           </m:ctrlPr>
-                        </m:sSubPr>
+                        </m:sSubSupPr>
                         <m:e>
                           <m:r>
                             <a:rPr lang="en-US" sz="3600" i="1">
@@ -4038,12 +4052,12 @@
                               </a:solidFill>
                               <a:latin typeface="Cambria Math" panose="02040503050406030204" pitchFamily="18" charset="0"/>
                             </a:rPr>
-                            <m:t>𝜏</m:t>
+                            <m:t>𝑥</m:t>
                           </m:r>
                         </m:e>
                         <m:sub>
                           <m:r>
-                            <a:rPr lang="en-US" sz="3600" b="0" i="1" smtClean="0">
+                            <a:rPr lang="en-US" sz="3600" i="1">
                               <a:solidFill>
                                 <a:srgbClr val="0000FF"/>
                               </a:solidFill>
@@ -4052,7 +4066,18 @@
                             <m:t>1</m:t>
                           </m:r>
                         </m:sub>
-                      </m:sSub>
+                        <m:sup>
+                          <m:r>
+                            <a:rPr lang="en-US" sz="3600" i="1">
+                              <a:solidFill>
+                                <a:srgbClr val="0000FF"/>
+                              </a:solidFill>
+                              <a:latin typeface="Cambria Math" panose="02040503050406030204" pitchFamily="18" charset="0"/>
+                            </a:rPr>
+                            <m:t>𝑡</m:t>
+                          </m:r>
+                        </m:sup>
+                      </m:sSubSup>
                     </m:oMath>
                   </m:oMathPara>
                 </a14:m>
@@ -4065,7 +4090,7 @@
             </p:txBody>
           </p:sp>
         </mc:Choice>
-        <mc:Fallback xmlns="">
+        <mc:Fallback>
           <p:sp>
             <p:nvSpPr>
               <p:cNvPr id="22" name="TextBox 21">
@@ -4082,7 +4107,7 @@
             </p:nvSpPr>
             <p:spPr>
               <a:xfrm>
-                <a:off x="416947" y="3747452"/>
+                <a:off x="897417" y="3747452"/>
                 <a:ext cx="715196" cy="646331"/>
               </a:xfrm>
               <a:prstGeom prst="rect">
@@ -4126,7 +4151,7 @@
             </p:nvSpPr>
             <p:spPr>
               <a:xfrm>
-                <a:off x="2895650" y="1038210"/>
+                <a:off x="3376120" y="1038210"/>
                 <a:ext cx="1753300" cy="653449"/>
               </a:xfrm>
               <a:prstGeom prst="rect">
@@ -4135,7 +4160,7 @@
               <a:noFill/>
             </p:spPr>
             <p:txBody>
-              <a:bodyPr wrap="none" rtlCol="0">
+              <a:bodyPr wrap="square" rtlCol="0">
                 <a:spAutoFit/>
               </a:bodyPr>
               <a:lstStyle/>
@@ -4204,7 +4229,7 @@
                       <m:r>
                         <a:rPr lang="en-US" sz="3600" b="0" i="1" smtClean="0">
                           <a:solidFill>
-                            <a:srgbClr val="0000FF"/>
+                            <a:schemeClr val="tx1"/>
                           </a:solidFill>
                           <a:latin typeface="Cambria Math" panose="02040503050406030204" pitchFamily="18" charset="0"/>
                         </a:rPr>
@@ -4215,7 +4240,7 @@
                           <m:ctrlPr>
                             <a:rPr lang="en-US" sz="3600" b="0" i="1" smtClean="0">
                               <a:solidFill>
-                                <a:srgbClr val="0000FF"/>
+                                <a:srgbClr val="FF00FF"/>
                               </a:solidFill>
                               <a:latin typeface="Cambria Math" panose="02040503050406030204" pitchFamily="18" charset="0"/>
                             </a:rPr>
@@ -4225,7 +4250,7 @@
                           <m:r>
                             <a:rPr lang="en-US" sz="3600" b="0" i="1" smtClean="0">
                               <a:solidFill>
-                                <a:srgbClr val="0000FF"/>
+                                <a:srgbClr val="FF00FF"/>
                               </a:solidFill>
                               <a:latin typeface="Cambria Math" panose="02040503050406030204" pitchFamily="18" charset="0"/>
                             </a:rPr>
@@ -4236,7 +4261,7 @@
                           <m:r>
                             <a:rPr lang="en-US" sz="3600" b="0" i="1" smtClean="0">
                               <a:solidFill>
-                                <a:srgbClr val="0000FF"/>
+                                <a:srgbClr val="FF00FF"/>
                               </a:solidFill>
                               <a:latin typeface="Cambria Math" panose="02040503050406030204" pitchFamily="18" charset="0"/>
                             </a:rPr>
@@ -4247,7 +4272,7 @@
                           <m:r>
                             <a:rPr lang="en-US" sz="3600" b="0" i="1" smtClean="0">
                               <a:solidFill>
-                                <a:srgbClr val="0000FF"/>
+                                <a:srgbClr val="FF00FF"/>
                               </a:solidFill>
                               <a:latin typeface="Cambria Math" panose="02040503050406030204" pitchFamily="18" charset="0"/>
                             </a:rPr>
@@ -4267,7 +4292,11 @@
                     </m:oMath>
                   </m:oMathPara>
                 </a14:m>
-                <a:endParaRPr lang="en-US" sz="3600" dirty="0"/>
+                <a:endParaRPr lang="en-US" sz="3600" dirty="0">
+                  <a:solidFill>
+                    <a:schemeClr val="tx1"/>
+                  </a:solidFill>
+                </a:endParaRPr>
               </a:p>
             </p:txBody>
           </p:sp>
@@ -4289,7 +4318,7 @@
             </p:nvSpPr>
             <p:spPr>
               <a:xfrm>
-                <a:off x="2895650" y="1038210"/>
+                <a:off x="3376120" y="1038210"/>
                 <a:ext cx="1753300" cy="653449"/>
               </a:xfrm>
               <a:prstGeom prst="rect">
@@ -4333,7 +4362,7 @@
             </p:nvSpPr>
             <p:spPr>
               <a:xfrm>
-                <a:off x="7198841" y="4243128"/>
+                <a:off x="7679311" y="4243128"/>
                 <a:ext cx="1745606" cy="648896"/>
               </a:xfrm>
               <a:prstGeom prst="rect">
@@ -4342,7 +4371,7 @@
               <a:noFill/>
             </p:spPr>
             <p:txBody>
-              <a:bodyPr wrap="none" rtlCol="0">
+              <a:bodyPr wrap="square" rtlCol="0">
                 <a:spAutoFit/>
               </a:bodyPr>
               <a:lstStyle/>
@@ -4368,7 +4397,7 @@
                           <m:ctrlPr>
                             <a:rPr lang="en-US" sz="3600" b="0" i="1" smtClean="0">
                               <a:solidFill>
-                                <a:schemeClr val="tx1"/>
+                                <a:srgbClr val="0000FF"/>
                               </a:solidFill>
                               <a:latin typeface="Cambria Math" panose="02040503050406030204" pitchFamily="18" charset="0"/>
                             </a:rPr>
@@ -4378,7 +4407,7 @@
                           <m:r>
                             <a:rPr lang="en-US" sz="3600" b="0" i="1" smtClean="0">
                               <a:solidFill>
-                                <a:schemeClr val="tx1"/>
+                                <a:srgbClr val="0000FF"/>
                               </a:solidFill>
                               <a:latin typeface="Cambria Math" panose="02040503050406030204" pitchFamily="18" charset="0"/>
                             </a:rPr>
@@ -4389,7 +4418,7 @@
                           <m:r>
                             <a:rPr lang="en-US" sz="3600" b="0" i="1" smtClean="0">
                               <a:solidFill>
-                                <a:schemeClr val="tx1"/>
+                                <a:srgbClr val="0000FF"/>
                               </a:solidFill>
                               <a:latin typeface="Cambria Math" panose="02040503050406030204" pitchFamily="18" charset="0"/>
                             </a:rPr>
@@ -4400,7 +4429,7 @@
                           <m:r>
                             <a:rPr lang="en-US" sz="3600" b="0" i="1" smtClean="0">
                               <a:solidFill>
-                                <a:schemeClr val="tx1"/>
+                                <a:srgbClr val="0000FF"/>
                               </a:solidFill>
                               <a:latin typeface="Cambria Math" panose="02040503050406030204" pitchFamily="18" charset="0"/>
                             </a:rPr>
@@ -4422,7 +4451,7 @@
                           <m:ctrlPr>
                             <a:rPr lang="en-US" sz="3600" b="0" i="1" smtClean="0">
                               <a:solidFill>
-                                <a:schemeClr val="tx1"/>
+                                <a:srgbClr val="FF00FF"/>
                               </a:solidFill>
                               <a:latin typeface="Cambria Math" panose="02040503050406030204" pitchFamily="18" charset="0"/>
                             </a:rPr>
@@ -4432,7 +4461,7 @@
                           <m:r>
                             <a:rPr lang="en-US" sz="3600" b="0" i="1" smtClean="0">
                               <a:solidFill>
-                                <a:schemeClr val="tx1"/>
+                                <a:srgbClr val="FF00FF"/>
                               </a:solidFill>
                               <a:latin typeface="Cambria Math" panose="02040503050406030204" pitchFamily="18" charset="0"/>
                             </a:rPr>
@@ -4443,7 +4472,7 @@
                           <m:r>
                             <a:rPr lang="en-US" sz="3600" b="0" i="1" smtClean="0">
                               <a:solidFill>
-                                <a:schemeClr val="tx1"/>
+                                <a:srgbClr val="FF00FF"/>
                               </a:solidFill>
                               <a:latin typeface="Cambria Math" panose="02040503050406030204" pitchFamily="18" charset="0"/>
                             </a:rPr>
@@ -4454,7 +4483,7 @@
                           <m:r>
                             <a:rPr lang="en-US" sz="3600" b="0" i="1" smtClean="0">
                               <a:solidFill>
-                                <a:schemeClr val="tx1"/>
+                                <a:srgbClr val="FF00FF"/>
                               </a:solidFill>
                               <a:latin typeface="Cambria Math" panose="02040503050406030204" pitchFamily="18" charset="0"/>
                             </a:rPr>
@@ -4496,7 +4525,7 @@
             </p:nvSpPr>
             <p:spPr>
               <a:xfrm>
-                <a:off x="7198841" y="4243128"/>
+                <a:off x="7679311" y="4243128"/>
                 <a:ext cx="1745606" cy="648896"/>
               </a:xfrm>
               <a:prstGeom prst="rect">
@@ -4540,7 +4569,7 @@
         </p:nvCxnSpPr>
         <p:spPr>
           <a:xfrm>
-            <a:off x="4684242" y="2289142"/>
+            <a:off x="5164712" y="2289142"/>
             <a:ext cx="2288459" cy="1828800"/>
           </a:xfrm>
           <a:prstGeom prst="straightConnector1">
@@ -4586,7 +4615,7 @@
         </p:nvCxnSpPr>
         <p:spPr>
           <a:xfrm flipH="1" flipV="1">
-            <a:off x="4684243" y="5032343"/>
+            <a:off x="5164713" y="5032343"/>
             <a:ext cx="2288458" cy="12738"/>
           </a:xfrm>
           <a:prstGeom prst="straightConnector1">
@@ -4615,8 +4644,8 @@
           </a:fontRef>
         </p:style>
       </p:cxnSp>
-      <mc:AlternateContent xmlns:mc="http://schemas.openxmlformats.org/markup-compatibility/2006" xmlns:a14="http://schemas.microsoft.com/office/drawing/2010/main">
-        <mc:Choice Requires="a14">
+      <mc:AlternateContent xmlns:mc="http://schemas.openxmlformats.org/markup-compatibility/2006">
+        <mc:Choice xmlns:a14="http://schemas.microsoft.com/office/drawing/2010/main" Requires="a14">
           <p:sp>
             <p:nvSpPr>
               <p:cNvPr id="43" name="TextBox 42">
@@ -4631,7 +4660,7 @@
             </p:nvSpPr>
             <p:spPr>
               <a:xfrm>
-                <a:off x="5265314" y="4306911"/>
+                <a:off x="5745784" y="4306911"/>
                 <a:ext cx="809901" cy="633571"/>
               </a:xfrm>
               <a:prstGeom prst="rect">
@@ -4640,7 +4669,7 @@
               <a:noFill/>
             </p:spPr>
             <p:txBody>
-              <a:bodyPr wrap="none" rtlCol="0">
+              <a:bodyPr wrap="square" rtlCol="0">
                 <a:spAutoFit/>
               </a:bodyPr>
               <a:lstStyle/>
@@ -4656,7 +4685,7 @@
                         <m:rPr>
                           <m:sty m:val="p"/>
                         </m:rPr>
-                        <a:rPr lang="en-US" sz="3600" b="0" i="0" dirty="0" smtClean="0">
+                        <a:rPr lang="en-US" sz="3600" dirty="0">
                           <a:solidFill>
                             <a:srgbClr val="FF00FF"/>
                           </a:solidFill>
@@ -4664,15 +4693,40 @@
                         </a:rPr>
                         <m:t>Δ</m:t>
                       </m:r>
-                      <m:r>
-                        <a:rPr lang="en-US" sz="3600" b="0" i="1" dirty="0" smtClean="0">
-                          <a:solidFill>
-                            <a:srgbClr val="FF00FF"/>
-                          </a:solidFill>
-                          <a:latin typeface="Cambria Math" panose="02040503050406030204" pitchFamily="18" charset="0"/>
-                        </a:rPr>
-                        <m:t>𝜎</m:t>
-                      </m:r>
+                      <m:sSup>
+                        <m:sSupPr>
+                          <m:ctrlPr>
+                            <a:rPr lang="en-US" sz="3600" i="1" dirty="0">
+                              <a:solidFill>
+                                <a:srgbClr val="FF00FF"/>
+                              </a:solidFill>
+                              <a:latin typeface="Cambria Math" panose="02040503050406030204" pitchFamily="18" charset="0"/>
+                            </a:rPr>
+                          </m:ctrlPr>
+                        </m:sSupPr>
+                        <m:e>
+                          <m:r>
+                            <a:rPr lang="en-US" sz="3600" i="1" dirty="0">
+                              <a:solidFill>
+                                <a:srgbClr val="FF00FF"/>
+                              </a:solidFill>
+                              <a:latin typeface="Cambria Math" panose="02040503050406030204" pitchFamily="18" charset="0"/>
+                            </a:rPr>
+                            <m:t>𝑥</m:t>
+                          </m:r>
+                        </m:e>
+                        <m:sup>
+                          <m:r>
+                            <a:rPr lang="en-US" sz="3600" i="1" dirty="0">
+                              <a:solidFill>
+                                <a:srgbClr val="FF00FF"/>
+                              </a:solidFill>
+                              <a:latin typeface="Cambria Math" panose="02040503050406030204" pitchFamily="18" charset="0"/>
+                            </a:rPr>
+                            <m:t>𝑟</m:t>
+                          </m:r>
+                        </m:sup>
+                      </m:sSup>
                     </m:oMath>
                   </m:oMathPara>
                 </a14:m>
@@ -4681,7 +4735,7 @@
             </p:txBody>
           </p:sp>
         </mc:Choice>
-        <mc:Fallback xmlns="">
+        <mc:Fallback>
           <p:sp>
             <p:nvSpPr>
               <p:cNvPr id="43" name="TextBox 42">
@@ -4698,7 +4752,7 @@
             </p:nvSpPr>
             <p:spPr>
               <a:xfrm>
-                <a:off x="5265314" y="4306911"/>
+                <a:off x="5745784" y="4306911"/>
                 <a:ext cx="809901" cy="633571"/>
               </a:xfrm>
               <a:prstGeom prst="rect">
@@ -4741,9 +4795,9 @@
           <p:nvPr/>
         </p:nvCxnSpPr>
         <p:spPr>
-          <a:xfrm flipH="1">
-            <a:off x="4684210" y="2673863"/>
-            <a:ext cx="32" cy="2364849"/>
+          <a:xfrm>
+            <a:off x="5164680" y="2514610"/>
+            <a:ext cx="0" cy="2524102"/>
           </a:xfrm>
           <a:prstGeom prst="line">
             <a:avLst/>
@@ -4781,13 +4835,14 @@
           </p:cNvPr>
           <p:cNvCxnSpPr>
             <a:cxnSpLocks/>
+            <a:stCxn id="20" idx="4"/>
           </p:cNvCxnSpPr>
           <p:nvPr/>
         </p:nvCxnSpPr>
         <p:spPr>
           <a:xfrm>
-            <a:off x="6972702" y="4502663"/>
-            <a:ext cx="7246" cy="1405660"/>
+            <a:off x="7453171" y="4346542"/>
+            <a:ext cx="7247" cy="1561781"/>
           </a:xfrm>
           <a:prstGeom prst="line">
             <a:avLst/>
@@ -4830,8 +4885,8 @@
         </p:nvCxnSpPr>
         <p:spPr>
           <a:xfrm>
-            <a:off x="7284707" y="2289142"/>
-            <a:ext cx="4389072" cy="0"/>
+            <a:off x="7679311" y="2283425"/>
+            <a:ext cx="3194792" cy="0"/>
           </a:xfrm>
           <a:prstGeom prst="line">
             <a:avLst/>
@@ -4873,9 +4928,9 @@
           <p:nvPr/>
         </p:nvCxnSpPr>
         <p:spPr>
-          <a:xfrm flipV="1">
-            <a:off x="9578694" y="4106506"/>
-            <a:ext cx="2095085" cy="11436"/>
+          <a:xfrm>
+            <a:off x="9967770" y="4117942"/>
+            <a:ext cx="906333" cy="0"/>
           </a:xfrm>
           <a:prstGeom prst="line">
             <a:avLst/>
@@ -4918,7 +4973,7 @@
             </p:nvSpPr>
             <p:spPr>
               <a:xfrm>
-                <a:off x="4981206" y="3118548"/>
+                <a:off x="5461676" y="3118548"/>
                 <a:ext cx="1234921" cy="633571"/>
               </a:xfrm>
               <a:prstGeom prst="rect">
@@ -4986,7 +5041,7 @@
             </p:nvSpPr>
             <p:spPr>
               <a:xfrm>
-                <a:off x="4981206" y="3118548"/>
+                <a:off x="5461676" y="3118548"/>
                 <a:ext cx="1234921" cy="633571"/>
               </a:xfrm>
               <a:prstGeom prst="rect">
@@ -5030,7 +5085,7 @@
             </p:nvSpPr>
             <p:spPr>
               <a:xfrm>
-                <a:off x="4981206" y="5197847"/>
+                <a:off x="5461676" y="5197847"/>
                 <a:ext cx="1007647" cy="633571"/>
               </a:xfrm>
               <a:prstGeom prst="rect">
@@ -5039,7 +5094,7 @@
               <a:noFill/>
             </p:spPr>
             <p:txBody>
-              <a:bodyPr wrap="none" rtlCol="0">
+              <a:bodyPr wrap="square" rtlCol="0">
                 <a:spAutoFit/>
               </a:bodyPr>
               <a:lstStyle/>
@@ -5055,7 +5110,7 @@
                         <m:rPr>
                           <m:sty m:val="p"/>
                         </m:rPr>
-                        <a:rPr lang="en-US" sz="3600" b="0" i="0" dirty="0" smtClean="0">
+                        <a:rPr lang="en-US" sz="3600" dirty="0" smtClean="0">
                           <a:solidFill>
                             <a:srgbClr val="FF00FF"/>
                           </a:solidFill>
@@ -5063,20 +5118,20 @@
                         </a:rPr>
                         <m:t>Δ</m:t>
                       </m:r>
-                      <m:sSup>
-                        <m:sSupPr>
+                      <m:sSubSup>
+                        <m:sSubSupPr>
                           <m:ctrlPr>
-                            <a:rPr lang="en-US" sz="3600" b="0" i="1" dirty="0" smtClean="0">
+                            <a:rPr lang="en-US" sz="3600" i="1" dirty="0">
                               <a:solidFill>
                                 <a:srgbClr val="FF00FF"/>
                               </a:solidFill>
                               <a:latin typeface="Cambria Math" panose="02040503050406030204" pitchFamily="18" charset="0"/>
                             </a:rPr>
                           </m:ctrlPr>
-                        </m:sSupPr>
+                        </m:sSubSupPr>
                         <m:e>
                           <m:r>
-                            <a:rPr lang="en-US" sz="3600" b="0" i="1" dirty="0" smtClean="0">
+                            <a:rPr lang="en-US" sz="3600" i="1" dirty="0">
                               <a:solidFill>
                                 <a:srgbClr val="FF00FF"/>
                               </a:solidFill>
@@ -5085,9 +5140,20 @@
                             <m:t>𝑥</m:t>
                           </m:r>
                         </m:e>
+                        <m:sub>
+                          <m:r>
+                            <a:rPr lang="en-US" sz="3600" b="0" i="1" dirty="0" smtClean="0">
+                              <a:solidFill>
+                                <a:srgbClr val="FF00FF"/>
+                              </a:solidFill>
+                              <a:latin typeface="Cambria Math" panose="02040503050406030204" pitchFamily="18" charset="0"/>
+                            </a:rPr>
+                            <m:t>1</m:t>
+                          </m:r>
+                        </m:sub>
                         <m:sup>
                           <m:r>
-                            <a:rPr lang="en-US" sz="3600" b="0" i="1" dirty="0" smtClean="0">
+                            <a:rPr lang="en-US" sz="3600" i="1" dirty="0">
                               <a:solidFill>
                                 <a:srgbClr val="FF00FF"/>
                               </a:solidFill>
@@ -5096,7 +5162,7 @@
                             <m:t>𝑟</m:t>
                           </m:r>
                         </m:sup>
-                      </m:sSup>
+                      </m:sSubSup>
                     </m:oMath>
                   </m:oMathPara>
                 </a14:m>
@@ -5122,7 +5188,7 @@
             </p:nvSpPr>
             <p:spPr>
               <a:xfrm>
-                <a:off x="4981206" y="5197847"/>
+                <a:off x="5461676" y="5197847"/>
                 <a:ext cx="1007647" cy="633571"/>
               </a:xfrm>
               <a:prstGeom prst="rect">
@@ -5166,7 +5232,7 @@
         </p:nvCxnSpPr>
         <p:spPr>
           <a:xfrm flipH="1">
-            <a:off x="3772300" y="5899085"/>
+            <a:off x="4252770" y="5899085"/>
             <a:ext cx="3207648" cy="9238"/>
           </a:xfrm>
           <a:prstGeom prst="straightConnector1">
@@ -5211,7 +5277,7 @@
             </p:nvSpPr>
             <p:spPr>
               <a:xfrm>
-                <a:off x="4981206" y="678677"/>
+                <a:off x="5461676" y="678677"/>
                 <a:ext cx="1007647" cy="637419"/>
               </a:xfrm>
               <a:prstGeom prst="rect">
@@ -5220,7 +5286,7 @@
               <a:noFill/>
             </p:spPr>
             <p:txBody>
-              <a:bodyPr wrap="none" rtlCol="0">
+              <a:bodyPr wrap="square" rtlCol="0">
                 <a:spAutoFit/>
               </a:bodyPr>
               <a:lstStyle/>
@@ -5314,7 +5380,7 @@
             </p:nvSpPr>
             <p:spPr>
               <a:xfrm>
-                <a:off x="4981206" y="678677"/>
+                <a:off x="5461676" y="678677"/>
                 <a:ext cx="1007647" cy="637419"/>
               </a:xfrm>
               <a:prstGeom prst="rect">
@@ -5358,7 +5424,7 @@
         </p:nvCxnSpPr>
         <p:spPr>
           <a:xfrm flipH="1" flipV="1">
-            <a:off x="4693714" y="1353428"/>
+            <a:off x="5174184" y="1353428"/>
             <a:ext cx="1364565" cy="21314"/>
           </a:xfrm>
           <a:prstGeom prst="straightConnector1">
@@ -5398,13 +5464,14 @@
           </p:cNvPr>
           <p:cNvCxnSpPr>
             <a:cxnSpLocks/>
+            <a:stCxn id="19" idx="4"/>
           </p:cNvCxnSpPr>
           <p:nvPr/>
         </p:nvCxnSpPr>
         <p:spPr>
           <a:xfrm>
-            <a:off x="3744198" y="4467651"/>
-            <a:ext cx="0" cy="1431434"/>
+            <a:off x="4244773" y="4346542"/>
+            <a:ext cx="0" cy="1552543"/>
           </a:xfrm>
           <a:prstGeom prst="line">
             <a:avLst/>
@@ -5447,7 +5514,7 @@
             </p:nvSpPr>
             <p:spPr>
               <a:xfrm>
-                <a:off x="3833299" y="2291817"/>
+                <a:off x="4313769" y="2291817"/>
                 <a:ext cx="746999" cy="646331"/>
               </a:xfrm>
               <a:prstGeom prst="rect">
@@ -5456,7 +5523,7 @@
               <a:noFill/>
             </p:spPr>
             <p:txBody>
-              <a:bodyPr wrap="none" rtlCol="0">
+              <a:bodyPr wrap="square" rtlCol="0">
                 <a:spAutoFit/>
               </a:bodyPr>
               <a:lstStyle/>
@@ -5518,7 +5585,7 @@
             </p:nvSpPr>
             <p:spPr>
               <a:xfrm>
-                <a:off x="3833299" y="2291817"/>
+                <a:off x="4313769" y="2291817"/>
                 <a:ext cx="746999" cy="646331"/>
               </a:xfrm>
               <a:prstGeom prst="rect">
@@ -5546,8 +5613,8 @@
           </p:sp>
         </mc:Fallback>
       </mc:AlternateContent>
-      <mc:AlternateContent xmlns:mc="http://schemas.openxmlformats.org/markup-compatibility/2006">
-        <mc:Choice xmlns:a14="http://schemas.microsoft.com/office/drawing/2010/main" Requires="a14">
+      <mc:AlternateContent xmlns:mc="http://schemas.openxmlformats.org/markup-compatibility/2006" xmlns:a14="http://schemas.microsoft.com/office/drawing/2010/main">
+        <mc:Choice Requires="a14">
           <p:sp>
             <p:nvSpPr>
               <p:cNvPr id="39" name="TextBox 38">
@@ -5562,7 +5629,7 @@
             </p:nvSpPr>
             <p:spPr>
               <a:xfrm>
-                <a:off x="7145068" y="3410055"/>
+                <a:off x="7625538" y="3410055"/>
                 <a:ext cx="801823" cy="646331"/>
               </a:xfrm>
               <a:prstGeom prst="rect">
@@ -5571,7 +5638,7 @@
               <a:noFill/>
             </p:spPr>
             <p:txBody>
-              <a:bodyPr wrap="none" rtlCol="0">
+              <a:bodyPr wrap="square" rtlCol="0">
                 <a:spAutoFit/>
               </a:bodyPr>
               <a:lstStyle/>
@@ -5603,7 +5670,7 @@
             </p:txBody>
           </p:sp>
         </mc:Choice>
-        <mc:Fallback>
+        <mc:Fallback xmlns="">
           <p:sp>
             <p:nvSpPr>
               <p:cNvPr id="39" name="TextBox 38">
@@ -5620,7 +5687,7 @@
             </p:nvSpPr>
             <p:spPr>
               <a:xfrm>
-                <a:off x="7145068" y="3410055"/>
+                <a:off x="7625538" y="3410055"/>
                 <a:ext cx="801823" cy="646331"/>
               </a:xfrm>
               <a:prstGeom prst="rect">
@@ -5650,10 +5717,10 @@
       </mc:AlternateContent>
       <p:cxnSp>
         <p:nvCxnSpPr>
-          <p:cNvPr id="42" name="Straight Arrow Connector 41">
-            <a:extLst>
-              <a:ext uri="{FF2B5EF4-FFF2-40B4-BE49-F238E27FC236}">
-                <a16:creationId xmlns:a16="http://schemas.microsoft.com/office/drawing/2014/main" id="{BBC12FE3-F994-FD72-055C-09D34AAB1C19}"/>
+          <p:cNvPr id="7" name="Straight Arrow Connector 6">
+            <a:extLst>
+              <a:ext uri="{FF2B5EF4-FFF2-40B4-BE49-F238E27FC236}">
+                <a16:creationId xmlns:a16="http://schemas.microsoft.com/office/drawing/2014/main" id="{71583E23-6EC0-2197-79F9-C43A92725974}"/>
               </a:ext>
             </a:extLst>
           </p:cNvPr>
@@ -5663,9 +5730,9 @@
           <p:nvPr/>
         </p:nvCxnSpPr>
         <p:spPr>
-          <a:xfrm>
-            <a:off x="9868272" y="2283425"/>
-            <a:ext cx="0" cy="1828800"/>
+          <a:xfrm flipH="1">
+            <a:off x="10599786" y="2289141"/>
+            <a:ext cx="14666" cy="1798395"/>
           </a:xfrm>
           <a:prstGeom prst="straightConnector1">
             <a:avLst/>
@@ -5697,162 +5764,6 @@
         <mc:Choice Requires="a14">
           <p:sp>
             <p:nvSpPr>
-              <p:cNvPr id="44" name="TextBox 43">
-                <a:extLst>
-                  <a:ext uri="{FF2B5EF4-FFF2-40B4-BE49-F238E27FC236}">
-                    <a16:creationId xmlns:a16="http://schemas.microsoft.com/office/drawing/2014/main" id="{98A04AD3-5CA2-55D6-5AD0-BF6621B501B6}"/>
-                  </a:ext>
-                </a:extLst>
-              </p:cNvPr>
-              <p:cNvSpPr txBox="1"/>
-              <p:nvPr/>
-            </p:nvSpPr>
-            <p:spPr>
-              <a:xfrm>
-                <a:off x="9882939" y="2874659"/>
-                <a:ext cx="693572" cy="646331"/>
-              </a:xfrm>
-              <a:prstGeom prst="rect">
-                <a:avLst/>
-              </a:prstGeom>
-              <a:noFill/>
-            </p:spPr>
-            <p:txBody>
-              <a:bodyPr wrap="square" rtlCol="0">
-                <a:spAutoFit/>
-              </a:bodyPr>
-              <a:lstStyle/>
-              <a:p>
-                <a:pPr/>
-                <a14:m>
-                  <m:oMathPara xmlns:m="http://schemas.openxmlformats.org/officeDocument/2006/math">
-                    <m:oMathParaPr>
-                      <m:jc m:val="centerGroup"/>
-                    </m:oMathParaPr>
-                    <m:oMath xmlns:m="http://schemas.openxmlformats.org/officeDocument/2006/math">
-                      <m:r>
-                        <m:rPr>
-                          <m:sty m:val="p"/>
-                        </m:rPr>
-                        <a:rPr lang="en-US" sz="3600" b="0" i="0" dirty="0" smtClean="0">
-                          <a:solidFill>
-                            <a:srgbClr val="0000FF"/>
-                          </a:solidFill>
-                          <a:latin typeface="Cambria Math" panose="02040503050406030204" pitchFamily="18" charset="0"/>
-                        </a:rPr>
-                        <m:t>Δ</m:t>
-                      </m:r>
-                      <m:r>
-                        <a:rPr lang="en-US" sz="3600" b="0" i="1" dirty="0" smtClean="0">
-                          <a:solidFill>
-                            <a:srgbClr val="0000FF"/>
-                          </a:solidFill>
-                          <a:latin typeface="Cambria Math" panose="02040503050406030204" pitchFamily="18" charset="0"/>
-                        </a:rPr>
-                        <m:t>𝜏</m:t>
-                      </m:r>
-                    </m:oMath>
-                  </m:oMathPara>
-                </a14:m>
-                <a:endParaRPr lang="en-US" sz="3600" dirty="0"/>
-              </a:p>
-            </p:txBody>
-          </p:sp>
-        </mc:Choice>
-        <mc:Fallback xmlns="">
-          <p:sp>
-            <p:nvSpPr>
-              <p:cNvPr id="44" name="TextBox 43">
-                <a:extLst>
-                  <a:ext uri="{FF2B5EF4-FFF2-40B4-BE49-F238E27FC236}">
-                    <a16:creationId xmlns:a16="http://schemas.microsoft.com/office/drawing/2014/main" id="{98A04AD3-5CA2-55D6-5AD0-BF6621B501B6}"/>
-                  </a:ext>
-                </a:extLst>
-              </p:cNvPr>
-              <p:cNvSpPr txBox="1">
-                <a:spLocks noRot="1" noChangeAspect="1" noMove="1" noResize="1" noEditPoints="1" noAdjustHandles="1" noChangeArrowheads="1" noChangeShapeType="1" noTextEdit="1"/>
-              </p:cNvSpPr>
-              <p:nvPr/>
-            </p:nvSpPr>
-            <p:spPr>
-              <a:xfrm>
-                <a:off x="9882939" y="2874659"/>
-                <a:ext cx="693572" cy="646331"/>
-              </a:xfrm>
-              <a:prstGeom prst="rect">
-                <a:avLst/>
-              </a:prstGeom>
-              <a:blipFill>
-                <a:blip r:embed="rId12"/>
-                <a:stretch>
-                  <a:fillRect/>
-                </a:stretch>
-              </a:blipFill>
-            </p:spPr>
-            <p:txBody>
-              <a:bodyPr/>
-              <a:lstStyle/>
-              <a:p>
-                <a:r>
-                  <a:rPr lang="en-US">
-                    <a:noFill/>
-                  </a:rPr>
-                  <a:t> </a:t>
-                </a:r>
-              </a:p>
-            </p:txBody>
-          </p:sp>
-        </mc:Fallback>
-      </mc:AlternateContent>
-      <p:cxnSp>
-        <p:nvCxnSpPr>
-          <p:cNvPr id="7" name="Straight Arrow Connector 6">
-            <a:extLst>
-              <a:ext uri="{FF2B5EF4-FFF2-40B4-BE49-F238E27FC236}">
-                <a16:creationId xmlns:a16="http://schemas.microsoft.com/office/drawing/2014/main" id="{71583E23-6EC0-2197-79F9-C43A92725974}"/>
-              </a:ext>
-            </a:extLst>
-          </p:cNvPr>
-          <p:cNvCxnSpPr>
-            <a:cxnSpLocks/>
-          </p:cNvCxnSpPr>
-          <p:nvPr/>
-        </p:nvCxnSpPr>
-        <p:spPr>
-          <a:xfrm flipH="1">
-            <a:off x="10759389" y="2289141"/>
-            <a:ext cx="14666" cy="1798395"/>
-          </a:xfrm>
-          <a:prstGeom prst="straightConnector1">
-            <a:avLst/>
-          </a:prstGeom>
-          <a:ln w="50800">
-            <a:solidFill>
-              <a:schemeClr val="tx1"/>
-            </a:solidFill>
-            <a:headEnd type="triangle"/>
-            <a:tailEnd type="triangle"/>
-          </a:ln>
-        </p:spPr>
-        <p:style>
-          <a:lnRef idx="1">
-            <a:schemeClr val="accent1"/>
-          </a:lnRef>
-          <a:fillRef idx="0">
-            <a:schemeClr val="accent1"/>
-          </a:fillRef>
-          <a:effectRef idx="0">
-            <a:schemeClr val="accent1"/>
-          </a:effectRef>
-          <a:fontRef idx="minor">
-            <a:schemeClr val="tx1"/>
-          </a:fontRef>
-        </p:style>
-      </p:cxnSp>
-      <mc:AlternateContent xmlns:mc="http://schemas.openxmlformats.org/markup-compatibility/2006">
-        <mc:Choice xmlns:a14="http://schemas.microsoft.com/office/drawing/2010/main" Requires="a14">
-          <p:sp>
-            <p:nvSpPr>
               <p:cNvPr id="8" name="TextBox 7">
                 <a:extLst>
                   <a:ext uri="{FF2B5EF4-FFF2-40B4-BE49-F238E27FC236}">
@@ -5865,7 +5776,7 @@
             </p:nvSpPr>
             <p:spPr>
               <a:xfrm>
-                <a:off x="10774055" y="2849970"/>
+                <a:off x="10614452" y="2849970"/>
                 <a:ext cx="876449" cy="646331"/>
               </a:xfrm>
               <a:prstGeom prst="rect">
@@ -5940,7 +5851,7 @@
             </p:txBody>
           </p:sp>
         </mc:Choice>
-        <mc:Fallback>
+        <mc:Fallback xmlns="">
           <p:sp>
             <p:nvSpPr>
               <p:cNvPr id="8" name="TextBox 7">
@@ -5957,14 +5868,14 @@
             </p:nvSpPr>
             <p:spPr>
               <a:xfrm>
-                <a:off x="10774055" y="2849970"/>
+                <a:off x="10614452" y="2849970"/>
                 <a:ext cx="876449" cy="646331"/>
               </a:xfrm>
               <a:prstGeom prst="rect">
                 <a:avLst/>
               </a:prstGeom>
               <a:blipFill>
-                <a:blip r:embed="rId13"/>
+                <a:blip r:embed="rId12"/>
                 <a:stretch>
                   <a:fillRect/>
                 </a:stretch>
@@ -6000,9 +5911,9 @@
           <p:nvPr/>
         </p:nvCxnSpPr>
         <p:spPr>
-          <a:xfrm flipV="1">
-            <a:off x="1249733" y="2289142"/>
-            <a:ext cx="2194536" cy="2675"/>
+          <a:xfrm>
+            <a:off x="1730203" y="2291817"/>
+            <a:ext cx="2285970" cy="0"/>
           </a:xfrm>
           <a:prstGeom prst="line">
             <a:avLst/>

</xml_diff>

<commit_message>
Final version of draft. Submitted to Classic Gravity.
</commit_message>
<xml_diff>
--- a/Spacetime Interval.pptx
+++ b/Spacetime Interval.pptx
@@ -270,7 +270,7 @@
           <a:p>
             <a:fld id="{A881878F-9A12-42FD-A084-B13F414915E6}" type="datetimeFigureOut">
               <a:rPr lang="en-US" smtClean="0"/>
-              <a:t>10/7/2023</a:t>
+              <a:t>10/18/2023</a:t>
             </a:fld>
             <a:endParaRPr lang="en-US"/>
           </a:p>
@@ -468,7 +468,7 @@
           <a:p>
             <a:fld id="{A881878F-9A12-42FD-A084-B13F414915E6}" type="datetimeFigureOut">
               <a:rPr lang="en-US" smtClean="0"/>
-              <a:t>10/7/2023</a:t>
+              <a:t>10/18/2023</a:t>
             </a:fld>
             <a:endParaRPr lang="en-US"/>
           </a:p>
@@ -676,7 +676,7 @@
           <a:p>
             <a:fld id="{A881878F-9A12-42FD-A084-B13F414915E6}" type="datetimeFigureOut">
               <a:rPr lang="en-US" smtClean="0"/>
-              <a:t>10/7/2023</a:t>
+              <a:t>10/18/2023</a:t>
             </a:fld>
             <a:endParaRPr lang="en-US"/>
           </a:p>
@@ -874,7 +874,7 @@
           <a:p>
             <a:fld id="{A881878F-9A12-42FD-A084-B13F414915E6}" type="datetimeFigureOut">
               <a:rPr lang="en-US" smtClean="0"/>
-              <a:t>10/7/2023</a:t>
+              <a:t>10/18/2023</a:t>
             </a:fld>
             <a:endParaRPr lang="en-US"/>
           </a:p>
@@ -1149,7 +1149,7 @@
           <a:p>
             <a:fld id="{A881878F-9A12-42FD-A084-B13F414915E6}" type="datetimeFigureOut">
               <a:rPr lang="en-US" smtClean="0"/>
-              <a:t>10/7/2023</a:t>
+              <a:t>10/18/2023</a:t>
             </a:fld>
             <a:endParaRPr lang="en-US"/>
           </a:p>
@@ -1414,7 +1414,7 @@
           <a:p>
             <a:fld id="{A881878F-9A12-42FD-A084-B13F414915E6}" type="datetimeFigureOut">
               <a:rPr lang="en-US" smtClean="0"/>
-              <a:t>10/7/2023</a:t>
+              <a:t>10/18/2023</a:t>
             </a:fld>
             <a:endParaRPr lang="en-US"/>
           </a:p>
@@ -1826,7 +1826,7 @@
           <a:p>
             <a:fld id="{A881878F-9A12-42FD-A084-B13F414915E6}" type="datetimeFigureOut">
               <a:rPr lang="en-US" smtClean="0"/>
-              <a:t>10/7/2023</a:t>
+              <a:t>10/18/2023</a:t>
             </a:fld>
             <a:endParaRPr lang="en-US"/>
           </a:p>
@@ -1967,7 +1967,7 @@
           <a:p>
             <a:fld id="{A881878F-9A12-42FD-A084-B13F414915E6}" type="datetimeFigureOut">
               <a:rPr lang="en-US" smtClean="0"/>
-              <a:t>10/7/2023</a:t>
+              <a:t>10/18/2023</a:t>
             </a:fld>
             <a:endParaRPr lang="en-US"/>
           </a:p>
@@ -2080,7 +2080,7 @@
           <a:p>
             <a:fld id="{A881878F-9A12-42FD-A084-B13F414915E6}" type="datetimeFigureOut">
               <a:rPr lang="en-US" smtClean="0"/>
-              <a:t>10/7/2023</a:t>
+              <a:t>10/18/2023</a:t>
             </a:fld>
             <a:endParaRPr lang="en-US"/>
           </a:p>
@@ -2391,7 +2391,7 @@
           <a:p>
             <a:fld id="{A881878F-9A12-42FD-A084-B13F414915E6}" type="datetimeFigureOut">
               <a:rPr lang="en-US" smtClean="0"/>
-              <a:t>10/7/2023</a:t>
+              <a:t>10/18/2023</a:t>
             </a:fld>
             <a:endParaRPr lang="en-US"/>
           </a:p>
@@ -2679,7 +2679,7 @@
           <a:p>
             <a:fld id="{A881878F-9A12-42FD-A084-B13F414915E6}" type="datetimeFigureOut">
               <a:rPr lang="en-US" smtClean="0"/>
-              <a:t>10/7/2023</a:t>
+              <a:t>10/18/2023</a:t>
             </a:fld>
             <a:endParaRPr lang="en-US"/>
           </a:p>
@@ -2920,7 +2920,7 @@
           <a:p>
             <a:fld id="{A881878F-9A12-42FD-A084-B13F414915E6}" type="datetimeFigureOut">
               <a:rPr lang="en-US" smtClean="0"/>
-              <a:t>10/7/2023</a:t>
+              <a:t>10/18/2023</a:t>
             </a:fld>
             <a:endParaRPr lang="en-US"/>
           </a:p>
@@ -3354,7 +3354,7 @@
         </p:nvCxnSpPr>
         <p:spPr>
           <a:xfrm flipH="1">
-            <a:off x="5167170" y="1372692"/>
+            <a:off x="5153730" y="1453661"/>
             <a:ext cx="7014" cy="687850"/>
           </a:xfrm>
           <a:prstGeom prst="line">
@@ -3399,7 +3399,7 @@
         </p:nvCxnSpPr>
         <p:spPr>
           <a:xfrm flipH="1">
-            <a:off x="6538749" y="1363060"/>
+            <a:off x="6525309" y="1444029"/>
             <a:ext cx="7014" cy="697482"/>
           </a:xfrm>
           <a:prstGeom prst="line">
@@ -3443,7 +3443,7 @@
         </p:nvCxnSpPr>
         <p:spPr>
           <a:xfrm>
-            <a:off x="4024190" y="2289162"/>
+            <a:off x="4010750" y="2370131"/>
             <a:ext cx="3657560" cy="0"/>
           </a:xfrm>
           <a:prstGeom prst="line">
@@ -3486,7 +3486,7 @@
         </p:nvCxnSpPr>
         <p:spPr>
           <a:xfrm>
-            <a:off x="1738170" y="4117942"/>
+            <a:off x="1724730" y="4198911"/>
             <a:ext cx="8229600" cy="0"/>
           </a:xfrm>
           <a:prstGeom prst="line">
@@ -3529,7 +3529,7 @@
         </p:nvCxnSpPr>
         <p:spPr>
           <a:xfrm>
-            <a:off x="4024190" y="1831942"/>
+            <a:off x="4010750" y="1912911"/>
             <a:ext cx="0" cy="914400"/>
           </a:xfrm>
           <a:prstGeom prst="line">
@@ -3568,7 +3568,7 @@
         </p:nvCxnSpPr>
         <p:spPr>
           <a:xfrm>
-            <a:off x="7681770" y="1831942"/>
+            <a:off x="7668330" y="1912911"/>
             <a:ext cx="0" cy="914400"/>
           </a:xfrm>
           <a:prstGeom prst="line">
@@ -3607,7 +3607,7 @@
         </p:nvCxnSpPr>
         <p:spPr>
           <a:xfrm>
-            <a:off x="1738170" y="3613418"/>
+            <a:off x="1724730" y="3694387"/>
             <a:ext cx="0" cy="914400"/>
           </a:xfrm>
           <a:prstGeom prst="line">
@@ -3646,7 +3646,7 @@
         </p:nvCxnSpPr>
         <p:spPr>
           <a:xfrm>
-            <a:off x="9967770" y="3613418"/>
+            <a:off x="9954330" y="3694387"/>
             <a:ext cx="0" cy="914400"/>
           </a:xfrm>
           <a:prstGeom prst="line">
@@ -3683,7 +3683,7 @@
         </p:nvSpPr>
         <p:spPr>
           <a:xfrm>
-            <a:off x="4938570" y="2060542"/>
+            <a:off x="4925130" y="2141511"/>
             <a:ext cx="457200" cy="457200"/>
           </a:xfrm>
           <a:prstGeom prst="ellipse">
@@ -3730,7 +3730,7 @@
         </p:nvSpPr>
         <p:spPr>
           <a:xfrm>
-            <a:off x="6310149" y="2060542"/>
+            <a:off x="6296709" y="2141511"/>
             <a:ext cx="457200" cy="457200"/>
           </a:xfrm>
           <a:prstGeom prst="ellipse">
@@ -3777,7 +3777,7 @@
         </p:nvSpPr>
         <p:spPr>
           <a:xfrm>
-            <a:off x="4016173" y="3889342"/>
+            <a:off x="4002733" y="3970311"/>
             <a:ext cx="457200" cy="457200"/>
           </a:xfrm>
           <a:prstGeom prst="ellipse">
@@ -3824,7 +3824,7 @@
         </p:nvSpPr>
         <p:spPr>
           <a:xfrm>
-            <a:off x="7224571" y="3889342"/>
+            <a:off x="7211131" y="3970311"/>
             <a:ext cx="457200" cy="457200"/>
           </a:xfrm>
           <a:prstGeom prst="ellipse">
@@ -3857,8 +3857,8 @@
           </a:p>
         </p:txBody>
       </p:sp>
-      <mc:AlternateContent xmlns:mc="http://schemas.openxmlformats.org/markup-compatibility/2006">
-        <mc:Choice xmlns:a14="http://schemas.microsoft.com/office/drawing/2010/main" Requires="a14">
+      <mc:AlternateContent xmlns:mc="http://schemas.openxmlformats.org/markup-compatibility/2006" xmlns:a14="http://schemas.microsoft.com/office/drawing/2010/main">
+        <mc:Choice Requires="a14">
           <p:sp>
             <p:nvSpPr>
               <p:cNvPr id="21" name="TextBox 20">
@@ -3873,7 +3873,7 @@
             </p:nvSpPr>
             <p:spPr>
               <a:xfrm>
-                <a:off x="907252" y="1965976"/>
+                <a:off x="893812" y="2046945"/>
                 <a:ext cx="715196" cy="653449"/>
               </a:xfrm>
               <a:prstGeom prst="rect">
@@ -3897,7 +3897,7 @@
                       <m:sSubSup>
                         <m:sSubSupPr>
                           <m:ctrlPr>
-                            <a:rPr lang="en-US" sz="3600" i="1" smtClean="0">
+                            <a:rPr lang="en-US" sz="3600" b="0" i="1" smtClean="0">
                               <a:solidFill>
                                 <a:srgbClr val="0000FF"/>
                               </a:solidFill>
@@ -3907,7 +3907,7 @@
                         </m:sSubSupPr>
                         <m:e>
                           <m:r>
-                            <a:rPr lang="en-US" sz="3600" i="1">
+                            <a:rPr lang="en-US" sz="3600" b="0" i="1" smtClean="0">
                               <a:solidFill>
                                 <a:srgbClr val="0000FF"/>
                               </a:solidFill>
@@ -3918,7 +3918,7 @@
                         </m:e>
                         <m:sub>
                           <m:r>
-                            <a:rPr lang="en-US" sz="3600" i="1">
+                            <a:rPr lang="en-US" sz="3600" b="0" i="1" smtClean="0">
                               <a:solidFill>
                                 <a:srgbClr val="0000FF"/>
                               </a:solidFill>
@@ -3929,7 +3929,7 @@
                         </m:sub>
                         <m:sup>
                           <m:r>
-                            <a:rPr lang="en-US" sz="3600" i="1">
+                            <a:rPr lang="en-US" sz="3600" b="0" i="1" smtClean="0">
                               <a:solidFill>
                                 <a:srgbClr val="0000FF"/>
                               </a:solidFill>
@@ -3951,7 +3951,7 @@
             </p:txBody>
           </p:sp>
         </mc:Choice>
-        <mc:Fallback>
+        <mc:Fallback xmlns="">
           <p:sp>
             <p:nvSpPr>
               <p:cNvPr id="21" name="TextBox 20">
@@ -3968,7 +3968,7 @@
             </p:nvSpPr>
             <p:spPr>
               <a:xfrm>
-                <a:off x="907252" y="1965976"/>
+                <a:off x="893812" y="2046945"/>
                 <a:ext cx="715196" cy="653449"/>
               </a:xfrm>
               <a:prstGeom prst="rect">
@@ -3996,8 +3996,8 @@
           </p:sp>
         </mc:Fallback>
       </mc:AlternateContent>
-      <mc:AlternateContent xmlns:mc="http://schemas.openxmlformats.org/markup-compatibility/2006">
-        <mc:Choice xmlns:a14="http://schemas.microsoft.com/office/drawing/2010/main" Requires="a14">
+      <mc:AlternateContent xmlns:mc="http://schemas.openxmlformats.org/markup-compatibility/2006" xmlns:a14="http://schemas.microsoft.com/office/drawing/2010/main">
+        <mc:Choice Requires="a14">
           <p:sp>
             <p:nvSpPr>
               <p:cNvPr id="22" name="TextBox 21">
@@ -4012,7 +4012,7 @@
             </p:nvSpPr>
             <p:spPr>
               <a:xfrm>
-                <a:off x="897417" y="3747452"/>
+                <a:off x="883977" y="3828421"/>
                 <a:ext cx="715196" cy="646331"/>
               </a:xfrm>
               <a:prstGeom prst="rect">
@@ -4036,7 +4036,7 @@
                       <m:sSubSup>
                         <m:sSubSupPr>
                           <m:ctrlPr>
-                            <a:rPr lang="en-US" sz="3600" i="1" smtClean="0">
+                            <a:rPr lang="en-US" sz="3600" b="0" i="1" smtClean="0">
                               <a:solidFill>
                                 <a:srgbClr val="0000FF"/>
                               </a:solidFill>
@@ -4046,7 +4046,7 @@
                         </m:sSubSupPr>
                         <m:e>
                           <m:r>
-                            <a:rPr lang="en-US" sz="3600" i="1">
+                            <a:rPr lang="en-US" sz="3600" b="0" i="1" smtClean="0">
                               <a:solidFill>
                                 <a:srgbClr val="0000FF"/>
                               </a:solidFill>
@@ -4057,7 +4057,7 @@
                         </m:e>
                         <m:sub>
                           <m:r>
-                            <a:rPr lang="en-US" sz="3600" i="1">
+                            <a:rPr lang="en-US" sz="3600" b="0" i="1" smtClean="0">
                               <a:solidFill>
                                 <a:srgbClr val="0000FF"/>
                               </a:solidFill>
@@ -4068,7 +4068,7 @@
                         </m:sub>
                         <m:sup>
                           <m:r>
-                            <a:rPr lang="en-US" sz="3600" i="1">
+                            <a:rPr lang="en-US" sz="3600" b="0" i="1" smtClean="0">
                               <a:solidFill>
                                 <a:srgbClr val="0000FF"/>
                               </a:solidFill>
@@ -4090,7 +4090,7 @@
             </p:txBody>
           </p:sp>
         </mc:Choice>
-        <mc:Fallback>
+        <mc:Fallback xmlns="">
           <p:sp>
             <p:nvSpPr>
               <p:cNvPr id="22" name="TextBox 21">
@@ -4107,7 +4107,7 @@
             </p:nvSpPr>
             <p:spPr>
               <a:xfrm>
-                <a:off x="897417" y="3747452"/>
+                <a:off x="883977" y="3828421"/>
                 <a:ext cx="715196" cy="646331"/>
               </a:xfrm>
               <a:prstGeom prst="rect">
@@ -4135,8 +4135,8 @@
           </p:sp>
         </mc:Fallback>
       </mc:AlternateContent>
-      <mc:AlternateContent xmlns:mc="http://schemas.openxmlformats.org/markup-compatibility/2006">
-        <mc:Choice xmlns:a14="http://schemas.microsoft.com/office/drawing/2010/main" Requires="a14">
+      <mc:AlternateContent xmlns:mc="http://schemas.openxmlformats.org/markup-compatibility/2006" xmlns:a14="http://schemas.microsoft.com/office/drawing/2010/main">
+        <mc:Choice Requires="a14">
           <p:sp>
             <p:nvSpPr>
               <p:cNvPr id="25" name="TextBox 24">
@@ -4151,7 +4151,7 @@
             </p:nvSpPr>
             <p:spPr>
               <a:xfrm>
-                <a:off x="3376120" y="1038210"/>
+                <a:off x="3362680" y="1119179"/>
                 <a:ext cx="1753300" cy="653449"/>
               </a:xfrm>
               <a:prstGeom prst="rect">
@@ -4301,7 +4301,7 @@
             </p:txBody>
           </p:sp>
         </mc:Choice>
-        <mc:Fallback>
+        <mc:Fallback xmlns="">
           <p:sp>
             <p:nvSpPr>
               <p:cNvPr id="25" name="TextBox 24">
@@ -4318,7 +4318,7 @@
             </p:nvSpPr>
             <p:spPr>
               <a:xfrm>
-                <a:off x="3376120" y="1038210"/>
+                <a:off x="3362680" y="1119179"/>
                 <a:ext cx="1753300" cy="653449"/>
               </a:xfrm>
               <a:prstGeom prst="rect">
@@ -4346,8 +4346,8 @@
           </p:sp>
         </mc:Fallback>
       </mc:AlternateContent>
-      <mc:AlternateContent xmlns:mc="http://schemas.openxmlformats.org/markup-compatibility/2006">
-        <mc:Choice xmlns:a14="http://schemas.microsoft.com/office/drawing/2010/main" Requires="a14">
+      <mc:AlternateContent xmlns:mc="http://schemas.openxmlformats.org/markup-compatibility/2006" xmlns:a14="http://schemas.microsoft.com/office/drawing/2010/main">
+        <mc:Choice Requires="a14">
           <p:sp>
             <p:nvSpPr>
               <p:cNvPr id="28" name="TextBox 27">
@@ -4362,7 +4362,7 @@
             </p:nvSpPr>
             <p:spPr>
               <a:xfrm>
-                <a:off x="7679311" y="4243128"/>
+                <a:off x="7665871" y="4324097"/>
                 <a:ext cx="1745606" cy="648896"/>
               </a:xfrm>
               <a:prstGeom prst="rect">
@@ -4508,7 +4508,7 @@
             </p:txBody>
           </p:sp>
         </mc:Choice>
-        <mc:Fallback>
+        <mc:Fallback xmlns="">
           <p:sp>
             <p:nvSpPr>
               <p:cNvPr id="28" name="TextBox 27">
@@ -4525,7 +4525,7 @@
             </p:nvSpPr>
             <p:spPr>
               <a:xfrm>
-                <a:off x="7679311" y="4243128"/>
+                <a:off x="7665871" y="4324097"/>
                 <a:ext cx="1745606" cy="648896"/>
               </a:xfrm>
               <a:prstGeom prst="rect">
@@ -4569,7 +4569,7 @@
         </p:nvCxnSpPr>
         <p:spPr>
           <a:xfrm>
-            <a:off x="5164712" y="2289142"/>
+            <a:off x="5151272" y="2370111"/>
             <a:ext cx="2288459" cy="1828800"/>
           </a:xfrm>
           <a:prstGeom prst="straightConnector1">
@@ -4615,7 +4615,7 @@
         </p:nvCxnSpPr>
         <p:spPr>
           <a:xfrm flipH="1" flipV="1">
-            <a:off x="5164713" y="5032343"/>
+            <a:off x="5151273" y="5113312"/>
             <a:ext cx="2288458" cy="12738"/>
           </a:xfrm>
           <a:prstGeom prst="straightConnector1">
@@ -4660,7 +4660,7 @@
             </p:nvSpPr>
             <p:spPr>
               <a:xfrm>
-                <a:off x="5745784" y="4306911"/>
+                <a:off x="5732344" y="4387880"/>
                 <a:ext cx="809901" cy="633571"/>
               </a:xfrm>
               <a:prstGeom prst="rect">
@@ -4685,7 +4685,7 @@
                         <m:rPr>
                           <m:sty m:val="p"/>
                         </m:rPr>
-                        <a:rPr lang="en-US" sz="3600" dirty="0">
+                        <a:rPr lang="en-US" sz="3600" dirty="0" smtClean="0">
                           <a:solidFill>
                             <a:srgbClr val="FF00FF"/>
                           </a:solidFill>
@@ -4693,40 +4693,24 @@
                         </a:rPr>
                         <m:t>Δ</m:t>
                       </m:r>
-                      <m:sSup>
-                        <m:sSupPr>
-                          <m:ctrlPr>
-                            <a:rPr lang="en-US" sz="3600" i="1" dirty="0">
-                              <a:solidFill>
-                                <a:srgbClr val="FF00FF"/>
-                              </a:solidFill>
-                              <a:latin typeface="Cambria Math" panose="02040503050406030204" pitchFamily="18" charset="0"/>
-                            </a:rPr>
-                          </m:ctrlPr>
-                        </m:sSupPr>
-                        <m:e>
-                          <m:r>
-                            <a:rPr lang="en-US" sz="3600" i="1" dirty="0">
-                              <a:solidFill>
-                                <a:srgbClr val="FF00FF"/>
-                              </a:solidFill>
-                              <a:latin typeface="Cambria Math" panose="02040503050406030204" pitchFamily="18" charset="0"/>
-                            </a:rPr>
-                            <m:t>𝑥</m:t>
-                          </m:r>
-                        </m:e>
-                        <m:sup>
-                          <m:r>
-                            <a:rPr lang="en-US" sz="3600" i="1" dirty="0">
-                              <a:solidFill>
-                                <a:srgbClr val="FF00FF"/>
-                              </a:solidFill>
-                              <a:latin typeface="Cambria Math" panose="02040503050406030204" pitchFamily="18" charset="0"/>
-                            </a:rPr>
-                            <m:t>𝑟</m:t>
-                          </m:r>
-                        </m:sup>
-                      </m:sSup>
+                      <m:r>
+                        <a:rPr lang="en-US" sz="3600" b="0" i="1" dirty="0" smtClean="0">
+                          <a:solidFill>
+                            <a:srgbClr val="FF00FF"/>
+                          </a:solidFill>
+                          <a:latin typeface="Cambria Math" panose="02040503050406030204" pitchFamily="18" charset="0"/>
+                        </a:rPr>
+                        <m:t>𝑟</m:t>
+                      </m:r>
+                      <m:r>
+                        <a:rPr lang="en-US" sz="3600" b="0" i="1" dirty="0" smtClean="0">
+                          <a:solidFill>
+                            <a:srgbClr val="FF00FF"/>
+                          </a:solidFill>
+                          <a:latin typeface="Cambria Math" panose="02040503050406030204" pitchFamily="18" charset="0"/>
+                        </a:rPr>
+                        <m:t>′</m:t>
+                      </m:r>
                     </m:oMath>
                   </m:oMathPara>
                 </a14:m>
@@ -4752,7 +4736,7 @@
             </p:nvSpPr>
             <p:spPr>
               <a:xfrm>
-                <a:off x="5745784" y="4306911"/>
+                <a:off x="5732344" y="4387880"/>
                 <a:ext cx="809901" cy="633571"/>
               </a:xfrm>
               <a:prstGeom prst="rect">
@@ -4796,7 +4780,7 @@
         </p:nvCxnSpPr>
         <p:spPr>
           <a:xfrm>
-            <a:off x="5164680" y="2514610"/>
+            <a:off x="5151240" y="2595579"/>
             <a:ext cx="0" cy="2524102"/>
           </a:xfrm>
           <a:prstGeom prst="line">
@@ -4841,7 +4825,7 @@
         </p:nvCxnSpPr>
         <p:spPr>
           <a:xfrm>
-            <a:off x="7453171" y="4346542"/>
+            <a:off x="7439731" y="4427511"/>
             <a:ext cx="7247" cy="1561781"/>
           </a:xfrm>
           <a:prstGeom prst="line">
@@ -4885,8 +4869,8 @@
         </p:nvCxnSpPr>
         <p:spPr>
           <a:xfrm>
-            <a:off x="7679311" y="2283425"/>
-            <a:ext cx="3194792" cy="0"/>
+            <a:off x="7665871" y="2372786"/>
+            <a:ext cx="3811590" cy="0"/>
           </a:xfrm>
           <a:prstGeom prst="line">
             <a:avLst/>
@@ -4929,8 +4913,8 @@
         </p:nvCxnSpPr>
         <p:spPr>
           <a:xfrm>
-            <a:off x="9967770" y="4117942"/>
-            <a:ext cx="906333" cy="0"/>
+            <a:off x="9954330" y="4198911"/>
+            <a:ext cx="1523131" cy="0"/>
           </a:xfrm>
           <a:prstGeom prst="line">
             <a:avLst/>
@@ -4973,7 +4957,7 @@
             </p:nvSpPr>
             <p:spPr>
               <a:xfrm>
-                <a:off x="5461676" y="3118548"/>
+                <a:off x="5448236" y="3199517"/>
                 <a:ext cx="1234921" cy="633571"/>
               </a:xfrm>
               <a:prstGeom prst="rect">
@@ -5041,7 +5025,7 @@
             </p:nvSpPr>
             <p:spPr>
               <a:xfrm>
-                <a:off x="5461676" y="3118548"/>
+                <a:off x="5448236" y="3199517"/>
                 <a:ext cx="1234921" cy="633571"/>
               </a:xfrm>
               <a:prstGeom prst="rect">
@@ -5069,8 +5053,8 @@
           </p:sp>
         </mc:Fallback>
       </mc:AlternateContent>
-      <mc:AlternateContent xmlns:mc="http://schemas.openxmlformats.org/markup-compatibility/2006">
-        <mc:Choice xmlns:a14="http://schemas.microsoft.com/office/drawing/2010/main" Requires="a14">
+      <mc:AlternateContent xmlns:mc="http://schemas.openxmlformats.org/markup-compatibility/2006" xmlns:a14="http://schemas.microsoft.com/office/drawing/2010/main">
+        <mc:Choice Requires="a14">
           <p:sp>
             <p:nvSpPr>
               <p:cNvPr id="46" name="TextBox 45">
@@ -5085,8 +5069,8 @@
             </p:nvSpPr>
             <p:spPr>
               <a:xfrm>
-                <a:off x="5461676" y="5197847"/>
-                <a:ext cx="1007647" cy="633571"/>
+                <a:off x="5448236" y="5278816"/>
+                <a:ext cx="1007647" cy="658450"/>
               </a:xfrm>
               <a:prstGeom prst="rect">
                 <a:avLst/>
@@ -5118,20 +5102,20 @@
                         </a:rPr>
                         <m:t>Δ</m:t>
                       </m:r>
-                      <m:sSubSup>
-                        <m:sSubSupPr>
+                      <m:sSup>
+                        <m:sSupPr>
                           <m:ctrlPr>
-                            <a:rPr lang="en-US" sz="3600" i="1" dirty="0">
+                            <a:rPr lang="en-US" sz="3600" b="0" i="1" dirty="0" smtClean="0">
                               <a:solidFill>
                                 <a:srgbClr val="FF00FF"/>
                               </a:solidFill>
                               <a:latin typeface="Cambria Math" panose="02040503050406030204" pitchFamily="18" charset="0"/>
                             </a:rPr>
                           </m:ctrlPr>
-                        </m:sSubSupPr>
+                        </m:sSupPr>
                         <m:e>
                           <m:r>
-                            <a:rPr lang="en-US" sz="3600" i="1" dirty="0">
+                            <a:rPr lang="en-US" sz="3600" i="1" dirty="0" smtClean="0">
                               <a:solidFill>
                                 <a:srgbClr val="FF00FF"/>
                               </a:solidFill>
@@ -5140,20 +5124,9 @@
                             <m:t>𝑥</m:t>
                           </m:r>
                         </m:e>
-                        <m:sub>
+                        <m:sup>
                           <m:r>
                             <a:rPr lang="en-US" sz="3600" b="0" i="1" dirty="0" smtClean="0">
-                              <a:solidFill>
-                                <a:srgbClr val="FF00FF"/>
-                              </a:solidFill>
-                              <a:latin typeface="Cambria Math" panose="02040503050406030204" pitchFamily="18" charset="0"/>
-                            </a:rPr>
-                            <m:t>1</m:t>
-                          </m:r>
-                        </m:sub>
-                        <m:sup>
-                          <m:r>
-                            <a:rPr lang="en-US" sz="3600" i="1" dirty="0">
                               <a:solidFill>
                                 <a:srgbClr val="FF00FF"/>
                               </a:solidFill>
@@ -5162,7 +5135,7 @@
                             <m:t>𝑟</m:t>
                           </m:r>
                         </m:sup>
-                      </m:sSubSup>
+                      </m:sSup>
                     </m:oMath>
                   </m:oMathPara>
                 </a14:m>
@@ -5171,7 +5144,7 @@
             </p:txBody>
           </p:sp>
         </mc:Choice>
-        <mc:Fallback>
+        <mc:Fallback xmlns="">
           <p:sp>
             <p:nvSpPr>
               <p:cNvPr id="46" name="TextBox 45">
@@ -5188,8 +5161,8 @@
             </p:nvSpPr>
             <p:spPr>
               <a:xfrm>
-                <a:off x="5461676" y="5197847"/>
-                <a:ext cx="1007647" cy="633571"/>
+                <a:off x="5448236" y="5278816"/>
+                <a:ext cx="1007647" cy="658450"/>
               </a:xfrm>
               <a:prstGeom prst="rect">
                 <a:avLst/>
@@ -5232,7 +5205,7 @@
         </p:nvCxnSpPr>
         <p:spPr>
           <a:xfrm flipH="1">
-            <a:off x="4252770" y="5899085"/>
+            <a:off x="4239330" y="5980054"/>
             <a:ext cx="3207648" cy="9238"/>
           </a:xfrm>
           <a:prstGeom prst="straightConnector1">
@@ -5261,8 +5234,8 @@
           </a:fontRef>
         </p:style>
       </p:cxnSp>
-      <mc:AlternateContent xmlns:mc="http://schemas.openxmlformats.org/markup-compatibility/2006">
-        <mc:Choice xmlns:a14="http://schemas.microsoft.com/office/drawing/2010/main" Requires="a14">
+      <mc:AlternateContent xmlns:mc="http://schemas.openxmlformats.org/markup-compatibility/2006" xmlns:a14="http://schemas.microsoft.com/office/drawing/2010/main">
+        <mc:Choice Requires="a14">
           <p:sp>
             <p:nvSpPr>
               <p:cNvPr id="51" name="TextBox 50">
@@ -5277,7 +5250,7 @@
             </p:nvSpPr>
             <p:spPr>
               <a:xfrm>
-                <a:off x="5461676" y="678677"/>
+                <a:off x="5448236" y="759646"/>
                 <a:ext cx="1007647" cy="637419"/>
               </a:xfrm>
               <a:prstGeom prst="rect">
@@ -5363,7 +5336,7 @@
             </p:txBody>
           </p:sp>
         </mc:Choice>
-        <mc:Fallback>
+        <mc:Fallback xmlns="">
           <p:sp>
             <p:nvSpPr>
               <p:cNvPr id="51" name="TextBox 50">
@@ -5380,7 +5353,7 @@
             </p:nvSpPr>
             <p:spPr>
               <a:xfrm>
-                <a:off x="5461676" y="678677"/>
+                <a:off x="5448236" y="759646"/>
                 <a:ext cx="1007647" cy="637419"/>
               </a:xfrm>
               <a:prstGeom prst="rect">
@@ -5424,7 +5397,7 @@
         </p:nvCxnSpPr>
         <p:spPr>
           <a:xfrm flipH="1" flipV="1">
-            <a:off x="5174184" y="1353428"/>
+            <a:off x="5160744" y="1434397"/>
             <a:ext cx="1364565" cy="21314"/>
           </a:xfrm>
           <a:prstGeom prst="straightConnector1">
@@ -5470,7 +5443,7 @@
         </p:nvCxnSpPr>
         <p:spPr>
           <a:xfrm>
-            <a:off x="4244773" y="4346542"/>
+            <a:off x="4231333" y="4427511"/>
             <a:ext cx="0" cy="1552543"/>
           </a:xfrm>
           <a:prstGeom prst="line">
@@ -5514,7 +5487,7 @@
             </p:nvSpPr>
             <p:spPr>
               <a:xfrm>
-                <a:off x="4313769" y="2291817"/>
+                <a:off x="4300329" y="2372786"/>
                 <a:ext cx="746999" cy="646331"/>
               </a:xfrm>
               <a:prstGeom prst="rect">
@@ -5585,7 +5558,7 @@
             </p:nvSpPr>
             <p:spPr>
               <a:xfrm>
-                <a:off x="4313769" y="2291817"/>
+                <a:off x="4300329" y="2372786"/>
                 <a:ext cx="746999" cy="646331"/>
               </a:xfrm>
               <a:prstGeom prst="rect">
@@ -5629,7 +5602,7 @@
             </p:nvSpPr>
             <p:spPr>
               <a:xfrm>
-                <a:off x="7625538" y="3410055"/>
+                <a:off x="7612098" y="3491024"/>
                 <a:ext cx="801823" cy="646331"/>
               </a:xfrm>
               <a:prstGeom prst="rect">
@@ -5687,7 +5660,7 @@
             </p:nvSpPr>
             <p:spPr>
               <a:xfrm>
-                <a:off x="7625538" y="3410055"/>
+                <a:off x="7612098" y="3491024"/>
                 <a:ext cx="801823" cy="646331"/>
               </a:xfrm>
               <a:prstGeom prst="rect">
@@ -5717,10 +5690,10 @@
       </mc:AlternateContent>
       <p:cxnSp>
         <p:nvCxnSpPr>
-          <p:cNvPr id="7" name="Straight Arrow Connector 6">
-            <a:extLst>
-              <a:ext uri="{FF2B5EF4-FFF2-40B4-BE49-F238E27FC236}">
-                <a16:creationId xmlns:a16="http://schemas.microsoft.com/office/drawing/2014/main" id="{71583E23-6EC0-2197-79F9-C43A92725974}"/>
+          <p:cNvPr id="2" name="Straight Connector 1">
+            <a:extLst>
+              <a:ext uri="{FF2B5EF4-FFF2-40B4-BE49-F238E27FC236}">
+                <a16:creationId xmlns:a16="http://schemas.microsoft.com/office/drawing/2014/main" id="{791EAF15-CFE0-2A00-FA67-DE04D62F4C7E}"/>
               </a:ext>
             </a:extLst>
           </p:cNvPr>
@@ -5730,9 +5703,53 @@
           <p:nvPr/>
         </p:nvCxnSpPr>
         <p:spPr>
-          <a:xfrm flipH="1">
-            <a:off x="10599786" y="2289141"/>
-            <a:ext cx="14666" cy="1798395"/>
+          <a:xfrm>
+            <a:off x="1716763" y="2372786"/>
+            <a:ext cx="2285970" cy="0"/>
+          </a:xfrm>
+          <a:prstGeom prst="line">
+            <a:avLst/>
+          </a:prstGeom>
+          <a:ln w="31750">
+            <a:solidFill>
+              <a:schemeClr val="tx1"/>
+            </a:solidFill>
+            <a:prstDash val="sysDot"/>
+          </a:ln>
+        </p:spPr>
+        <p:style>
+          <a:lnRef idx="1">
+            <a:schemeClr val="accent1"/>
+          </a:lnRef>
+          <a:fillRef idx="0">
+            <a:schemeClr val="accent1"/>
+          </a:fillRef>
+          <a:effectRef idx="0">
+            <a:schemeClr val="accent1"/>
+          </a:effectRef>
+          <a:fontRef idx="minor">
+            <a:schemeClr val="tx1"/>
+          </a:fontRef>
+        </p:style>
+      </p:cxnSp>
+      <p:cxnSp>
+        <p:nvCxnSpPr>
+          <p:cNvPr id="10" name="Straight Arrow Connector 9">
+            <a:extLst>
+              <a:ext uri="{FF2B5EF4-FFF2-40B4-BE49-F238E27FC236}">
+                <a16:creationId xmlns:a16="http://schemas.microsoft.com/office/drawing/2014/main" id="{002574D6-4332-C7C4-5955-46A9D066DEB1}"/>
+              </a:ext>
+            </a:extLst>
+          </p:cNvPr>
+          <p:cNvCxnSpPr>
+            <a:cxnSpLocks/>
+          </p:cNvCxnSpPr>
+          <p:nvPr/>
+        </p:nvCxnSpPr>
+        <p:spPr>
+          <a:xfrm>
+            <a:off x="10692451" y="2364394"/>
+            <a:ext cx="0" cy="1834517"/>
           </a:xfrm>
           <a:prstGeom prst="straightConnector1">
             <a:avLst/>
@@ -5764,10 +5781,10 @@
         <mc:Choice Requires="a14">
           <p:sp>
             <p:nvSpPr>
-              <p:cNvPr id="8" name="TextBox 7">
+              <p:cNvPr id="11" name="TextBox 10">
                 <a:extLst>
                   <a:ext uri="{FF2B5EF4-FFF2-40B4-BE49-F238E27FC236}">
-                    <a16:creationId xmlns:a16="http://schemas.microsoft.com/office/drawing/2014/main" id="{F6D093B2-BF74-93D7-84B0-DD1EEE3D9969}"/>
+                    <a16:creationId xmlns:a16="http://schemas.microsoft.com/office/drawing/2014/main" id="{AB8D36AF-0B6F-54D9-EBC3-8BE1A5B0D164}"/>
                   </a:ext>
                 </a:extLst>
               </p:cNvPr>
@@ -5776,7 +5793,7 @@
             </p:nvSpPr>
             <p:spPr>
               <a:xfrm>
-                <a:off x="10614452" y="2849970"/>
+                <a:off x="10692451" y="2958487"/>
                 <a:ext cx="876449" cy="646331"/>
               </a:xfrm>
               <a:prstGeom prst="rect">
@@ -5854,10 +5871,10 @@
         <mc:Fallback xmlns="">
           <p:sp>
             <p:nvSpPr>
-              <p:cNvPr id="8" name="TextBox 7">
+              <p:cNvPr id="11" name="TextBox 10">
                 <a:extLst>
                   <a:ext uri="{FF2B5EF4-FFF2-40B4-BE49-F238E27FC236}">
-                    <a16:creationId xmlns:a16="http://schemas.microsoft.com/office/drawing/2014/main" id="{F6D093B2-BF74-93D7-84B0-DD1EEE3D9969}"/>
+                    <a16:creationId xmlns:a16="http://schemas.microsoft.com/office/drawing/2014/main" id="{AB8D36AF-0B6F-54D9-EBC3-8BE1A5B0D164}"/>
                   </a:ext>
                 </a:extLst>
               </p:cNvPr>
@@ -5868,7 +5885,7 @@
             </p:nvSpPr>
             <p:spPr>
               <a:xfrm>
-                <a:off x="10614452" y="2849970"/>
+                <a:off x="10692451" y="2958487"/>
                 <a:ext cx="876449" cy="646331"/>
               </a:xfrm>
               <a:prstGeom prst="rect">
@@ -5896,50 +5913,6 @@
           </p:sp>
         </mc:Fallback>
       </mc:AlternateContent>
-      <p:cxnSp>
-        <p:nvCxnSpPr>
-          <p:cNvPr id="2" name="Straight Connector 1">
-            <a:extLst>
-              <a:ext uri="{FF2B5EF4-FFF2-40B4-BE49-F238E27FC236}">
-                <a16:creationId xmlns:a16="http://schemas.microsoft.com/office/drawing/2014/main" id="{791EAF15-CFE0-2A00-FA67-DE04D62F4C7E}"/>
-              </a:ext>
-            </a:extLst>
-          </p:cNvPr>
-          <p:cNvCxnSpPr>
-            <a:cxnSpLocks/>
-          </p:cNvCxnSpPr>
-          <p:nvPr/>
-        </p:nvCxnSpPr>
-        <p:spPr>
-          <a:xfrm>
-            <a:off x="1730203" y="2291817"/>
-            <a:ext cx="2285970" cy="0"/>
-          </a:xfrm>
-          <a:prstGeom prst="line">
-            <a:avLst/>
-          </a:prstGeom>
-          <a:ln w="31750">
-            <a:solidFill>
-              <a:schemeClr val="tx1"/>
-            </a:solidFill>
-            <a:prstDash val="sysDot"/>
-          </a:ln>
-        </p:spPr>
-        <p:style>
-          <a:lnRef idx="1">
-            <a:schemeClr val="accent1"/>
-          </a:lnRef>
-          <a:fillRef idx="0">
-            <a:schemeClr val="accent1"/>
-          </a:fillRef>
-          <a:effectRef idx="0">
-            <a:schemeClr val="accent1"/>
-          </a:effectRef>
-          <a:fontRef idx="minor">
-            <a:schemeClr val="tx1"/>
-          </a:fontRef>
-        </p:style>
-      </p:cxnSp>
     </p:spTree>
     <p:extLst>
       <p:ext uri="{BB962C8B-B14F-4D97-AF65-F5344CB8AC3E}">

</xml_diff>